<commit_message>
Update Activities of Daily Living-recognition-with-wrist-worn-accelerometer.pptx
</commit_message>
<xml_diff>
--- a/Activities of Daily Living-recognition-with-wrist-worn-accelerometer.pptx
+++ b/Activities of Daily Living-recognition-with-wrist-worn-accelerometer.pptx
@@ -3307,7 +3307,7 @@
           <a:p>
             <a:fld id="{360CA529-25A5-4D4C-AD42-63295B410EC8}" type="datetimeFigureOut">
               <a:rPr lang="de-DE" smtClean="0"/>
-              <a:t>25.08.2023</a:t>
+              <a:t>26.08.2023</a:t>
             </a:fld>
             <a:endParaRPr lang="de-DE"/>
           </a:p>
@@ -3505,7 +3505,7 @@
           <a:p>
             <a:fld id="{360CA529-25A5-4D4C-AD42-63295B410EC8}" type="datetimeFigureOut">
               <a:rPr lang="de-DE" smtClean="0"/>
-              <a:t>25.08.2023</a:t>
+              <a:t>26.08.2023</a:t>
             </a:fld>
             <a:endParaRPr lang="de-DE"/>
           </a:p>
@@ -3713,7 +3713,7 @@
           <a:p>
             <a:fld id="{360CA529-25A5-4D4C-AD42-63295B410EC8}" type="datetimeFigureOut">
               <a:rPr lang="de-DE" smtClean="0"/>
-              <a:t>25.08.2023</a:t>
+              <a:t>26.08.2023</a:t>
             </a:fld>
             <a:endParaRPr lang="de-DE"/>
           </a:p>
@@ -3911,7 +3911,7 @@
           <a:p>
             <a:fld id="{360CA529-25A5-4D4C-AD42-63295B410EC8}" type="datetimeFigureOut">
               <a:rPr lang="de-DE" smtClean="0"/>
-              <a:t>25.08.2023</a:t>
+              <a:t>26.08.2023</a:t>
             </a:fld>
             <a:endParaRPr lang="de-DE"/>
           </a:p>
@@ -4186,7 +4186,7 @@
           <a:p>
             <a:fld id="{360CA529-25A5-4D4C-AD42-63295B410EC8}" type="datetimeFigureOut">
               <a:rPr lang="de-DE" smtClean="0"/>
-              <a:t>25.08.2023</a:t>
+              <a:t>26.08.2023</a:t>
             </a:fld>
             <a:endParaRPr lang="de-DE"/>
           </a:p>
@@ -4451,7 +4451,7 @@
           <a:p>
             <a:fld id="{360CA529-25A5-4D4C-AD42-63295B410EC8}" type="datetimeFigureOut">
               <a:rPr lang="de-DE" smtClean="0"/>
-              <a:t>25.08.2023</a:t>
+              <a:t>26.08.2023</a:t>
             </a:fld>
             <a:endParaRPr lang="de-DE"/>
           </a:p>
@@ -4863,7 +4863,7 @@
           <a:p>
             <a:fld id="{360CA529-25A5-4D4C-AD42-63295B410EC8}" type="datetimeFigureOut">
               <a:rPr lang="de-DE" smtClean="0"/>
-              <a:t>25.08.2023</a:t>
+              <a:t>26.08.2023</a:t>
             </a:fld>
             <a:endParaRPr lang="de-DE"/>
           </a:p>
@@ -5004,7 +5004,7 @@
           <a:p>
             <a:fld id="{360CA529-25A5-4D4C-AD42-63295B410EC8}" type="datetimeFigureOut">
               <a:rPr lang="de-DE" smtClean="0"/>
-              <a:t>25.08.2023</a:t>
+              <a:t>26.08.2023</a:t>
             </a:fld>
             <a:endParaRPr lang="de-DE"/>
           </a:p>
@@ -5117,7 +5117,7 @@
           <a:p>
             <a:fld id="{360CA529-25A5-4D4C-AD42-63295B410EC8}" type="datetimeFigureOut">
               <a:rPr lang="de-DE" smtClean="0"/>
-              <a:t>25.08.2023</a:t>
+              <a:t>26.08.2023</a:t>
             </a:fld>
             <a:endParaRPr lang="de-DE"/>
           </a:p>
@@ -5428,7 +5428,7 @@
           <a:p>
             <a:fld id="{360CA529-25A5-4D4C-AD42-63295B410EC8}" type="datetimeFigureOut">
               <a:rPr lang="de-DE" smtClean="0"/>
-              <a:t>25.08.2023</a:t>
+              <a:t>26.08.2023</a:t>
             </a:fld>
             <a:endParaRPr lang="de-DE"/>
           </a:p>
@@ -5716,7 +5716,7 @@
           <a:p>
             <a:fld id="{360CA529-25A5-4D4C-AD42-63295B410EC8}" type="datetimeFigureOut">
               <a:rPr lang="de-DE" smtClean="0"/>
-              <a:t>25.08.2023</a:t>
+              <a:t>26.08.2023</a:t>
             </a:fld>
             <a:endParaRPr lang="de-DE"/>
           </a:p>
@@ -5957,7 +5957,7 @@
           <a:p>
             <a:fld id="{360CA529-25A5-4D4C-AD42-63295B410EC8}" type="datetimeFigureOut">
               <a:rPr lang="de-DE" smtClean="0"/>
-              <a:t>25.08.2023</a:t>
+              <a:t>26.08.2023</a:t>
             </a:fld>
             <a:endParaRPr lang="de-DE"/>
           </a:p>
@@ -21025,7 +21025,7 @@
         </p:nvSpPr>
         <p:spPr>
           <a:xfrm>
-            <a:off x="3215729" y="1764407"/>
+            <a:off x="3215424" y="1289954"/>
             <a:ext cx="5760846" cy="2310312"/>
           </a:xfrm>
         </p:spPr>
@@ -21052,6 +21052,97 @@
               <a:ea typeface="+mj-ea"/>
               <a:cs typeface="+mj-cs"/>
             </a:endParaRPr>
+          </a:p>
+        </p:txBody>
+      </p:sp>
+      <p:pic>
+        <p:nvPicPr>
+          <p:cNvPr id="4" name="Picture 3">
+            <a:extLst>
+              <a:ext uri="{FF2B5EF4-FFF2-40B4-BE49-F238E27FC236}">
+                <a16:creationId xmlns:a16="http://schemas.microsoft.com/office/drawing/2014/main" id="{1B23633A-297D-57A9-5E54-458C645C3732}"/>
+              </a:ext>
+            </a:extLst>
+          </p:cNvPr>
+          <p:cNvPicPr>
+            <a:picLocks noChangeAspect="1"/>
+          </p:cNvPicPr>
+          <p:nvPr/>
+        </p:nvPicPr>
+        <p:blipFill>
+          <a:blip r:embed="rId2">
+            <a:extLst>
+              <a:ext uri="{28A0092B-C50C-407E-A947-70E740481C1C}">
+                <a14:useLocalDpi xmlns:a14="http://schemas.microsoft.com/office/drawing/2010/main" val="0"/>
+              </a:ext>
+            </a:extLst>
+          </a:blip>
+          <a:stretch>
+            <a:fillRect/>
+          </a:stretch>
+        </p:blipFill>
+        <p:spPr>
+          <a:xfrm>
+            <a:off x="5397108" y="5322498"/>
+            <a:ext cx="1397478" cy="1397478"/>
+          </a:xfrm>
+          <a:prstGeom prst="rect">
+            <a:avLst/>
+          </a:prstGeom>
+        </p:spPr>
+      </p:pic>
+      <p:sp>
+        <p:nvSpPr>
+          <p:cNvPr id="6" name="TextBox 5">
+            <a:extLst>
+              <a:ext uri="{FF2B5EF4-FFF2-40B4-BE49-F238E27FC236}">
+                <a16:creationId xmlns:a16="http://schemas.microsoft.com/office/drawing/2014/main" id="{2A52E86D-2BA0-F833-7CA2-A7E34E2C9268}"/>
+              </a:ext>
+            </a:extLst>
+          </p:cNvPr>
+          <p:cNvSpPr txBox="1"/>
+          <p:nvPr/>
+        </p:nvSpPr>
+        <p:spPr>
+          <a:xfrm>
+            <a:off x="6794586" y="5318514"/>
+            <a:ext cx="1526876" cy="523220"/>
+          </a:xfrm>
+          <a:prstGeom prst="rect">
+            <a:avLst/>
+          </a:prstGeom>
+          <a:noFill/>
+        </p:spPr>
+        <p:txBody>
+          <a:bodyPr wrap="square" rtlCol="0">
+            <a:spAutoFit/>
+          </a:bodyPr>
+          <a:lstStyle/>
+          <a:p>
+            <a:r>
+              <a:rPr lang="de-DE" sz="1400" i="1" dirty="0" err="1"/>
+              <a:t>You</a:t>
+            </a:r>
+            <a:r>
+              <a:rPr lang="de-DE" sz="1400" i="1" dirty="0"/>
+              <a:t> </a:t>
+            </a:r>
+            <a:r>
+              <a:rPr lang="de-DE" sz="1400" i="1" dirty="0" err="1"/>
+              <a:t>can</a:t>
+            </a:r>
+            <a:r>
+              <a:rPr lang="de-DE" sz="1400" i="1" dirty="0"/>
+              <a:t> find </a:t>
+            </a:r>
+            <a:r>
+              <a:rPr lang="de-DE" sz="1400" i="1" dirty="0" err="1"/>
+              <a:t>us</a:t>
+            </a:r>
+            <a:r>
+              <a:rPr lang="de-DE" sz="1400" i="1" dirty="0"/>
+              <a:t> on GitHub!</a:t>
+            </a:r>
           </a:p>
         </p:txBody>
       </p:sp>
@@ -29874,8 +29965,8 @@
             <a:chExt cx="6509060" cy="5022889"/>
           </a:xfrm>
         </p:grpSpPr>
-        <mc:AlternateContent xmlns:mc="http://schemas.openxmlformats.org/markup-compatibility/2006">
-          <mc:Choice xmlns:a14="http://schemas.microsoft.com/office/drawing/2010/main" Requires="a14">
+        <mc:AlternateContent xmlns:mc="http://schemas.openxmlformats.org/markup-compatibility/2006" xmlns:a14="http://schemas.microsoft.com/office/drawing/2010/main">
+          <mc:Choice Requires="a14">
             <p:sp>
               <p:nvSpPr>
                 <p:cNvPr id="4" name="Rechteck 3">
@@ -29981,7 +30072,7 @@
               </p:txBody>
             </p:sp>
           </mc:Choice>
-          <mc:Fallback>
+          <mc:Fallback xmlns="">
             <p:sp>
               <p:nvSpPr>
                 <p:cNvPr id="4" name="Rechteck 3">
@@ -30035,8 +30126,8 @@
             </p:sp>
           </mc:Fallback>
         </mc:AlternateContent>
-        <mc:AlternateContent xmlns:mc="http://schemas.openxmlformats.org/markup-compatibility/2006">
-          <mc:Choice xmlns:a14="http://schemas.microsoft.com/office/drawing/2010/main" Requires="a14">
+        <mc:AlternateContent xmlns:mc="http://schemas.openxmlformats.org/markup-compatibility/2006" xmlns:a14="http://schemas.microsoft.com/office/drawing/2010/main">
+          <mc:Choice Requires="a14">
             <p:sp>
               <p:nvSpPr>
                 <p:cNvPr id="5" name="Rechteck 4">
@@ -30142,7 +30233,7 @@
               </p:txBody>
             </p:sp>
           </mc:Choice>
-          <mc:Fallback>
+          <mc:Fallback xmlns="">
             <p:sp>
               <p:nvSpPr>
                 <p:cNvPr id="5" name="Rechteck 4">
@@ -30196,8 +30287,8 @@
             </p:sp>
           </mc:Fallback>
         </mc:AlternateContent>
-        <mc:AlternateContent xmlns:mc="http://schemas.openxmlformats.org/markup-compatibility/2006">
-          <mc:Choice xmlns:a14="http://schemas.microsoft.com/office/drawing/2010/main" Requires="a14">
+        <mc:AlternateContent xmlns:mc="http://schemas.openxmlformats.org/markup-compatibility/2006" xmlns:a14="http://schemas.microsoft.com/office/drawing/2010/main">
+          <mc:Choice Requires="a14">
             <p:sp>
               <p:nvSpPr>
                 <p:cNvPr id="6" name="Rechteck 5">
@@ -30303,7 +30394,7 @@
               </p:txBody>
             </p:sp>
           </mc:Choice>
-          <mc:Fallback>
+          <mc:Fallback xmlns="">
             <p:sp>
               <p:nvSpPr>
                 <p:cNvPr id="6" name="Rechteck 5">
@@ -30357,8 +30448,8 @@
             </p:sp>
           </mc:Fallback>
         </mc:AlternateContent>
-        <mc:AlternateContent xmlns:mc="http://schemas.openxmlformats.org/markup-compatibility/2006">
-          <mc:Choice xmlns:a14="http://schemas.microsoft.com/office/drawing/2010/main" Requires="a14">
+        <mc:AlternateContent xmlns:mc="http://schemas.openxmlformats.org/markup-compatibility/2006" xmlns:a14="http://schemas.microsoft.com/office/drawing/2010/main">
+          <mc:Choice Requires="a14">
             <p:sp>
               <p:nvSpPr>
                 <p:cNvPr id="7" name="Rechteck 6">
@@ -30464,7 +30555,7 @@
               </p:txBody>
             </p:sp>
           </mc:Choice>
-          <mc:Fallback>
+          <mc:Fallback xmlns="">
             <p:sp>
               <p:nvSpPr>
                 <p:cNvPr id="7" name="Rechteck 6">
@@ -30518,8 +30609,8 @@
             </p:sp>
           </mc:Fallback>
         </mc:AlternateContent>
-        <mc:AlternateContent xmlns:mc="http://schemas.openxmlformats.org/markup-compatibility/2006">
-          <mc:Choice xmlns:a14="http://schemas.microsoft.com/office/drawing/2010/main" Requires="a14">
+        <mc:AlternateContent xmlns:mc="http://schemas.openxmlformats.org/markup-compatibility/2006" xmlns:a14="http://schemas.microsoft.com/office/drawing/2010/main">
+          <mc:Choice Requires="a14">
             <p:sp>
               <p:nvSpPr>
                 <p:cNvPr id="8" name="Rechteck 7">
@@ -30625,7 +30716,7 @@
               </p:txBody>
             </p:sp>
           </mc:Choice>
-          <mc:Fallback>
+          <mc:Fallback xmlns="">
             <p:sp>
               <p:nvSpPr>
                 <p:cNvPr id="8" name="Rechteck 7">
@@ -30679,8 +30770,8 @@
             </p:sp>
           </mc:Fallback>
         </mc:AlternateContent>
-        <mc:AlternateContent xmlns:mc="http://schemas.openxmlformats.org/markup-compatibility/2006">
-          <mc:Choice xmlns:a14="http://schemas.microsoft.com/office/drawing/2010/main" Requires="a14">
+        <mc:AlternateContent xmlns:mc="http://schemas.openxmlformats.org/markup-compatibility/2006" xmlns:a14="http://schemas.microsoft.com/office/drawing/2010/main">
+          <mc:Choice Requires="a14">
             <p:sp>
               <p:nvSpPr>
                 <p:cNvPr id="9" name="Rechteck 8">
@@ -30786,7 +30877,7 @@
               </p:txBody>
             </p:sp>
           </mc:Choice>
-          <mc:Fallback>
+          <mc:Fallback xmlns="">
             <p:sp>
               <p:nvSpPr>
                 <p:cNvPr id="9" name="Rechteck 8">
@@ -30840,8 +30931,8 @@
             </p:sp>
           </mc:Fallback>
         </mc:AlternateContent>
-        <mc:AlternateContent xmlns:mc="http://schemas.openxmlformats.org/markup-compatibility/2006">
-          <mc:Choice xmlns:a14="http://schemas.microsoft.com/office/drawing/2010/main" Requires="a14">
+        <mc:AlternateContent xmlns:mc="http://schemas.openxmlformats.org/markup-compatibility/2006" xmlns:a14="http://schemas.microsoft.com/office/drawing/2010/main">
+          <mc:Choice Requires="a14">
             <p:sp>
               <p:nvSpPr>
                 <p:cNvPr id="10" name="Flussdiagramm: Verbinder 9">
@@ -30931,7 +31022,7 @@
               </p:txBody>
             </p:sp>
           </mc:Choice>
-          <mc:Fallback>
+          <mc:Fallback xmlns="">
             <p:sp>
               <p:nvSpPr>
                 <p:cNvPr id="10" name="Flussdiagramm: Verbinder 9">
@@ -30985,8 +31076,8 @@
             </p:sp>
           </mc:Fallback>
         </mc:AlternateContent>
-        <mc:AlternateContent xmlns:mc="http://schemas.openxmlformats.org/markup-compatibility/2006">
-          <mc:Choice xmlns:a14="http://schemas.microsoft.com/office/drawing/2010/main" Requires="a14">
+        <mc:AlternateContent xmlns:mc="http://schemas.openxmlformats.org/markup-compatibility/2006" xmlns:a14="http://schemas.microsoft.com/office/drawing/2010/main">
+          <mc:Choice Requires="a14">
             <p:sp>
               <p:nvSpPr>
                 <p:cNvPr id="12" name="Flussdiagramm: Verbinder 11">
@@ -31090,7 +31181,7 @@
               </p:txBody>
             </p:sp>
           </mc:Choice>
-          <mc:Fallback>
+          <mc:Fallback xmlns="">
             <p:sp>
               <p:nvSpPr>
                 <p:cNvPr id="12" name="Flussdiagramm: Verbinder 11">
@@ -31144,8 +31235,8 @@
             </p:sp>
           </mc:Fallback>
         </mc:AlternateContent>
-        <mc:AlternateContent xmlns:mc="http://schemas.openxmlformats.org/markup-compatibility/2006">
-          <mc:Choice xmlns:a14="http://schemas.microsoft.com/office/drawing/2010/main" Requires="a14">
+        <mc:AlternateContent xmlns:mc="http://schemas.openxmlformats.org/markup-compatibility/2006" xmlns:a14="http://schemas.microsoft.com/office/drawing/2010/main">
+          <mc:Choice Requires="a14">
             <p:sp>
               <p:nvSpPr>
                 <p:cNvPr id="13" name="Flussdiagramm: Verbinder 12">
@@ -31249,7 +31340,7 @@
               </p:txBody>
             </p:sp>
           </mc:Choice>
-          <mc:Fallback>
+          <mc:Fallback xmlns="">
             <p:sp>
               <p:nvSpPr>
                 <p:cNvPr id="13" name="Flussdiagramm: Verbinder 12">
@@ -31303,8 +31394,8 @@
             </p:sp>
           </mc:Fallback>
         </mc:AlternateContent>
-        <mc:AlternateContent xmlns:mc="http://schemas.openxmlformats.org/markup-compatibility/2006">
-          <mc:Choice xmlns:a14="http://schemas.microsoft.com/office/drawing/2010/main" Requires="a14">
+        <mc:AlternateContent xmlns:mc="http://schemas.openxmlformats.org/markup-compatibility/2006" xmlns:a14="http://schemas.microsoft.com/office/drawing/2010/main">
+          <mc:Choice Requires="a14">
             <p:sp>
               <p:nvSpPr>
                 <p:cNvPr id="14" name="Flussdiagramm: Verbinder 13">
@@ -31408,7 +31499,7 @@
               </p:txBody>
             </p:sp>
           </mc:Choice>
-          <mc:Fallback>
+          <mc:Fallback xmlns="">
             <p:sp>
               <p:nvSpPr>
                 <p:cNvPr id="14" name="Flussdiagramm: Verbinder 13">
@@ -31869,8 +31960,8 @@
             </a:fontRef>
           </p:style>
         </p:cxnSp>
-        <mc:AlternateContent xmlns:mc="http://schemas.openxmlformats.org/markup-compatibility/2006">
-          <mc:Choice xmlns:a14="http://schemas.microsoft.com/office/drawing/2010/main" Requires="a14">
+        <mc:AlternateContent xmlns:mc="http://schemas.openxmlformats.org/markup-compatibility/2006" xmlns:a14="http://schemas.microsoft.com/office/drawing/2010/main">
+          <mc:Choice Requires="a14">
             <p:sp>
               <p:nvSpPr>
                 <p:cNvPr id="34" name="Rechteck 33">
@@ -31988,7 +32079,7 @@
               </p:txBody>
             </p:sp>
           </mc:Choice>
-          <mc:Fallback>
+          <mc:Fallback xmlns="">
             <p:sp>
               <p:nvSpPr>
                 <p:cNvPr id="34" name="Rechteck 33">
@@ -32042,8 +32133,8 @@
             </p:sp>
           </mc:Fallback>
         </mc:AlternateContent>
-        <mc:AlternateContent xmlns:mc="http://schemas.openxmlformats.org/markup-compatibility/2006">
-          <mc:Choice xmlns:a14="http://schemas.microsoft.com/office/drawing/2010/main" Requires="a14">
+        <mc:AlternateContent xmlns:mc="http://schemas.openxmlformats.org/markup-compatibility/2006" xmlns:a14="http://schemas.microsoft.com/office/drawing/2010/main">
+          <mc:Choice Requires="a14">
             <p:sp>
               <p:nvSpPr>
                 <p:cNvPr id="35" name="Rechteck 34">
@@ -32137,19 +32228,7 @@
                               <a:rPr lang="de-DE" i="1">
                                 <a:latin typeface="Cambria Math" panose="02040503050406030204" pitchFamily="18" charset="0"/>
                               </a:rPr>
-                              <m:t>(</m:t>
-                            </m:r>
-                            <m:r>
-                              <a:rPr lang="de-DE" i="1">
-                                <a:latin typeface="Cambria Math" panose="02040503050406030204" pitchFamily="18" charset="0"/>
-                              </a:rPr>
-                              <m:t>2</m:t>
-                            </m:r>
-                            <m:r>
-                              <a:rPr lang="de-DE" i="1">
-                                <a:latin typeface="Cambria Math" panose="02040503050406030204" pitchFamily="18" charset="0"/>
-                              </a:rPr>
-                              <m:t>)</m:t>
+                              <m:t>(2)</m:t>
                             </m:r>
                           </m:sup>
                         </m:sSup>
@@ -32161,7 +32240,7 @@
               </p:txBody>
             </p:sp>
           </mc:Choice>
-          <mc:Fallback>
+          <mc:Fallback xmlns="">
             <p:sp>
               <p:nvSpPr>
                 <p:cNvPr id="35" name="Rechteck 34">
@@ -32215,8 +32294,8 @@
             </p:sp>
           </mc:Fallback>
         </mc:AlternateContent>
-        <mc:AlternateContent xmlns:mc="http://schemas.openxmlformats.org/markup-compatibility/2006">
-          <mc:Choice xmlns:a14="http://schemas.microsoft.com/office/drawing/2010/main" Requires="a14">
+        <mc:AlternateContent xmlns:mc="http://schemas.openxmlformats.org/markup-compatibility/2006" xmlns:a14="http://schemas.microsoft.com/office/drawing/2010/main">
+          <mc:Choice Requires="a14">
             <p:sp>
               <p:nvSpPr>
                 <p:cNvPr id="37" name="Rechteck 36">
@@ -32310,19 +32389,7 @@
                               <a:rPr lang="de-DE" i="1">
                                 <a:latin typeface="Cambria Math" panose="02040503050406030204" pitchFamily="18" charset="0"/>
                               </a:rPr>
-                              <m:t>(</m:t>
-                            </m:r>
-                            <m:r>
-                              <a:rPr lang="de-DE" i="1">
-                                <a:latin typeface="Cambria Math" panose="02040503050406030204" pitchFamily="18" charset="0"/>
-                              </a:rPr>
-                              <m:t>2</m:t>
-                            </m:r>
-                            <m:r>
-                              <a:rPr lang="de-DE" i="1">
-                                <a:latin typeface="Cambria Math" panose="02040503050406030204" pitchFamily="18" charset="0"/>
-                              </a:rPr>
-                              <m:t>)</m:t>
+                              <m:t>(2)</m:t>
                             </m:r>
                           </m:sup>
                         </m:sSup>
@@ -32334,7 +32401,7 @@
               </p:txBody>
             </p:sp>
           </mc:Choice>
-          <mc:Fallback>
+          <mc:Fallback xmlns="">
             <p:sp>
               <p:nvSpPr>
                 <p:cNvPr id="37" name="Rechteck 36">
@@ -32388,8 +32455,8 @@
             </p:sp>
           </mc:Fallback>
         </mc:AlternateContent>
-        <mc:AlternateContent xmlns:mc="http://schemas.openxmlformats.org/markup-compatibility/2006">
-          <mc:Choice xmlns:a14="http://schemas.microsoft.com/office/drawing/2010/main" Requires="a14">
+        <mc:AlternateContent xmlns:mc="http://schemas.openxmlformats.org/markup-compatibility/2006" xmlns:a14="http://schemas.microsoft.com/office/drawing/2010/main">
+          <mc:Choice Requires="a14">
             <p:sp>
               <p:nvSpPr>
                 <p:cNvPr id="39" name="Rechteck 38">
@@ -32483,19 +32550,7 @@
                               <a:rPr lang="de-DE" i="1">
                                 <a:latin typeface="Cambria Math" panose="02040503050406030204" pitchFamily="18" charset="0"/>
                               </a:rPr>
-                              <m:t>(</m:t>
-                            </m:r>
-                            <m:r>
-                              <a:rPr lang="de-DE" i="1">
-                                <a:latin typeface="Cambria Math" panose="02040503050406030204" pitchFamily="18" charset="0"/>
-                              </a:rPr>
-                              <m:t>2</m:t>
-                            </m:r>
-                            <m:r>
-                              <a:rPr lang="de-DE" i="1">
-                                <a:latin typeface="Cambria Math" panose="02040503050406030204" pitchFamily="18" charset="0"/>
-                              </a:rPr>
-                              <m:t>)</m:t>
+                              <m:t>(2)</m:t>
                             </m:r>
                           </m:sup>
                         </m:sSup>
@@ -32507,7 +32562,7 @@
               </p:txBody>
             </p:sp>
           </mc:Choice>
-          <mc:Fallback>
+          <mc:Fallback xmlns="">
             <p:sp>
               <p:nvSpPr>
                 <p:cNvPr id="39" name="Rechteck 38">
@@ -32561,8 +32616,8 @@
             </p:sp>
           </mc:Fallback>
         </mc:AlternateContent>
-        <mc:AlternateContent xmlns:mc="http://schemas.openxmlformats.org/markup-compatibility/2006">
-          <mc:Choice xmlns:a14="http://schemas.microsoft.com/office/drawing/2010/main" Requires="a14">
+        <mc:AlternateContent xmlns:mc="http://schemas.openxmlformats.org/markup-compatibility/2006" xmlns:a14="http://schemas.microsoft.com/office/drawing/2010/main">
+          <mc:Choice Requires="a14">
             <p:sp>
               <p:nvSpPr>
                 <p:cNvPr id="47" name="Rechteck 46">
@@ -32656,19 +32711,7 @@
                               <a:rPr lang="de-DE" i="1">
                                 <a:latin typeface="Cambria Math" panose="02040503050406030204" pitchFamily="18" charset="0"/>
                               </a:rPr>
-                              <m:t>(</m:t>
-                            </m:r>
-                            <m:r>
-                              <a:rPr lang="de-DE" i="1">
-                                <a:latin typeface="Cambria Math" panose="02040503050406030204" pitchFamily="18" charset="0"/>
-                              </a:rPr>
-                              <m:t>2</m:t>
-                            </m:r>
-                            <m:r>
-                              <a:rPr lang="de-DE" i="1">
-                                <a:latin typeface="Cambria Math" panose="02040503050406030204" pitchFamily="18" charset="0"/>
-                              </a:rPr>
-                              <m:t>)</m:t>
+                              <m:t>(2)</m:t>
                             </m:r>
                           </m:sup>
                         </m:sSup>
@@ -32680,7 +32723,7 @@
               </p:txBody>
             </p:sp>
           </mc:Choice>
-          <mc:Fallback>
+          <mc:Fallback xmlns="">
             <p:sp>
               <p:nvSpPr>
                 <p:cNvPr id="47" name="Rechteck 46">
@@ -32734,8 +32777,8 @@
             </p:sp>
           </mc:Fallback>
         </mc:AlternateContent>
-        <mc:AlternateContent xmlns:mc="http://schemas.openxmlformats.org/markup-compatibility/2006">
-          <mc:Choice xmlns:a14="http://schemas.microsoft.com/office/drawing/2010/main" Requires="a14">
+        <mc:AlternateContent xmlns:mc="http://schemas.openxmlformats.org/markup-compatibility/2006" xmlns:a14="http://schemas.microsoft.com/office/drawing/2010/main">
+          <mc:Choice Requires="a14">
             <p:sp>
               <p:nvSpPr>
                 <p:cNvPr id="48" name="Rechteck 47">
@@ -32829,19 +32872,7 @@
                               <a:rPr lang="de-DE" i="1">
                                 <a:latin typeface="Cambria Math" panose="02040503050406030204" pitchFamily="18" charset="0"/>
                               </a:rPr>
-                              <m:t>(</m:t>
-                            </m:r>
-                            <m:r>
-                              <a:rPr lang="de-DE" i="1">
-                                <a:latin typeface="Cambria Math" panose="02040503050406030204" pitchFamily="18" charset="0"/>
-                              </a:rPr>
-                              <m:t>2</m:t>
-                            </m:r>
-                            <m:r>
-                              <a:rPr lang="de-DE" i="1">
-                                <a:latin typeface="Cambria Math" panose="02040503050406030204" pitchFamily="18" charset="0"/>
-                              </a:rPr>
-                              <m:t>)</m:t>
+                              <m:t>(2)</m:t>
                             </m:r>
                           </m:sup>
                         </m:sSup>
@@ -32853,7 +32884,7 @@
               </p:txBody>
             </p:sp>
           </mc:Choice>
-          <mc:Fallback>
+          <mc:Fallback xmlns="">
             <p:sp>
               <p:nvSpPr>
                 <p:cNvPr id="48" name="Rechteck 47">
@@ -39825,10 +39856,10 @@
       </p:grpSp>
       <p:pic>
         <p:nvPicPr>
-          <p:cNvPr id="5" name="Content Placeholder 4">
+          <p:cNvPr id="11" name="Content Placeholder 10">
             <a:extLst>
               <a:ext uri="{FF2B5EF4-FFF2-40B4-BE49-F238E27FC236}">
-                <a16:creationId xmlns:a16="http://schemas.microsoft.com/office/drawing/2014/main" id="{ADCBFB51-5B71-3273-27CF-4003352A0044}"/>
+                <a16:creationId xmlns:a16="http://schemas.microsoft.com/office/drawing/2014/main" id="{0120F9C4-FAB8-1BAF-01DF-C0328BBDF069}"/>
               </a:ext>
             </a:extLst>
           </p:cNvPr>
@@ -39853,8 +39884,8 @@
         </p:blipFill>
         <p:spPr>
           <a:xfrm>
-            <a:off x="568339" y="1549878"/>
-            <a:ext cx="7687140" cy="4329355"/>
+            <a:off x="-247640" y="1366289"/>
+            <a:ext cx="8362720" cy="4316383"/>
           </a:xfrm>
         </p:spPr>
       </p:pic>
@@ -39872,7 +39903,7 @@
         </p:nvSpPr>
         <p:spPr>
           <a:xfrm>
-            <a:off x="6820337" y="1845408"/>
+            <a:off x="6478438" y="1845408"/>
             <a:ext cx="4192437" cy="369332"/>
           </a:xfrm>
           <a:prstGeom prst="rect">
@@ -39900,106 +39931,735 @@
             </a:r>
             <a:r>
               <a:rPr lang="de-DE" dirty="0"/>
-              <a:t> 91.6201%</a:t>
+              <a:t> 91.62%</a:t>
             </a:r>
           </a:p>
         </p:txBody>
       </p:sp>
-      <p:sp>
-        <p:nvSpPr>
-          <p:cNvPr id="7" name="TextBox 6">
+      <p:graphicFrame>
+        <p:nvGraphicFramePr>
+          <p:cNvPr id="18" name="Table 18">
             <a:extLst>
               <a:ext uri="{FF2B5EF4-FFF2-40B4-BE49-F238E27FC236}">
-                <a16:creationId xmlns:a16="http://schemas.microsoft.com/office/drawing/2014/main" id="{FEA3E002-CFFA-F19A-17CC-2DB1080ED6B1}"/>
+                <a16:creationId xmlns:a16="http://schemas.microsoft.com/office/drawing/2014/main" id="{BC90F083-C73E-42DA-93D9-69DEE8A151B5}"/>
               </a:ext>
             </a:extLst>
           </p:cNvPr>
-          <p:cNvSpPr txBox="1"/>
-          <p:nvPr/>
-        </p:nvSpPr>
-        <p:spPr>
-          <a:xfrm>
-            <a:off x="7539487" y="3562709"/>
-            <a:ext cx="3674853" cy="646331"/>
-          </a:xfrm>
-          <a:prstGeom prst="rect">
-            <a:avLst/>
-          </a:prstGeom>
-          <a:noFill/>
-        </p:spPr>
-        <p:txBody>
-          <a:bodyPr wrap="square" rtlCol="0">
-            <a:spAutoFit/>
-          </a:bodyPr>
-          <a:lstStyle/>
-          <a:p>
-            <a:r>
-              <a:rPr lang="de-DE" dirty="0"/>
-              <a:t>TODO: </a:t>
-            </a:r>
-            <a:r>
-              <a:rPr lang="de-DE" dirty="0" err="1"/>
-              <a:t>compare</a:t>
-            </a:r>
-            <a:r>
-              <a:rPr lang="de-DE" dirty="0"/>
-              <a:t> </a:t>
-            </a:r>
-            <a:r>
-              <a:rPr lang="de-DE" dirty="0" err="1"/>
-              <a:t>values</a:t>
-            </a:r>
-            <a:r>
-              <a:rPr lang="de-DE" dirty="0"/>
-              <a:t> </a:t>
-            </a:r>
-            <a:r>
-              <a:rPr lang="de-DE" dirty="0" err="1"/>
-              <a:t>with</a:t>
-            </a:r>
-            <a:r>
-              <a:rPr lang="de-DE" dirty="0"/>
-              <a:t> </a:t>
-            </a:r>
-            <a:r>
-              <a:rPr lang="de-DE" dirty="0" err="1"/>
-              <a:t>the</a:t>
-            </a:r>
-            <a:r>
-              <a:rPr lang="de-DE" dirty="0"/>
-              <a:t> </a:t>
-            </a:r>
-            <a:r>
-              <a:rPr lang="de-DE" dirty="0" err="1"/>
-              <a:t>ones</a:t>
-            </a:r>
-            <a:endParaRPr lang="de-DE" dirty="0"/>
-          </a:p>
-          <a:p>
-            <a:r>
-              <a:rPr lang="de-DE" dirty="0" err="1"/>
-              <a:t>From</a:t>
-            </a:r>
-            <a:r>
-              <a:rPr lang="de-DE" dirty="0"/>
-              <a:t> </a:t>
-            </a:r>
-            <a:r>
-              <a:rPr lang="de-DE" dirty="0" err="1"/>
-              <a:t>the</a:t>
-            </a:r>
-            <a:r>
-              <a:rPr lang="de-DE" dirty="0"/>
-              <a:t> </a:t>
-            </a:r>
-            <a:r>
-              <a:rPr lang="de-DE" dirty="0" err="1"/>
-              <a:t>paper</a:t>
-            </a:r>
-            <a:endParaRPr lang="de-DE" dirty="0"/>
-          </a:p>
-        </p:txBody>
-      </p:sp>
+          <p:cNvGraphicFramePr>
+            <a:graphicFrameLocks noGrp="1"/>
+          </p:cNvGraphicFramePr>
+          <p:nvPr>
+            <p:extLst>
+              <p:ext uri="{D42A27DB-BD31-4B8C-83A1-F6EECF244321}">
+                <p14:modId xmlns:p14="http://schemas.microsoft.com/office/powerpoint/2010/main" val="2600598339"/>
+              </p:ext>
+            </p:extLst>
+          </p:nvPr>
+        </p:nvGraphicFramePr>
+        <p:xfrm>
+          <a:off x="6478438" y="3276097"/>
+          <a:ext cx="5641676" cy="3067019"/>
+        </p:xfrm>
+        <a:graphic>
+          <a:graphicData uri="http://schemas.openxmlformats.org/drawingml/2006/table">
+            <a:tbl>
+              <a:tblPr firstRow="1" bandRow="1">
+                <a:tableStyleId>{5C22544A-7EE6-4342-B048-85BDC9FD1C3A}</a:tableStyleId>
+              </a:tblPr>
+              <a:tblGrid>
+                <a:gridCol w="1124420">
+                  <a:extLst>
+                    <a:ext uri="{9D8B030D-6E8A-4147-A177-3AD203B41FA5}">
+                      <a16:colId xmlns:a16="http://schemas.microsoft.com/office/drawing/2014/main" val="1685644442"/>
+                    </a:ext>
+                  </a:extLst>
+                </a:gridCol>
+                <a:gridCol w="1021389">
+                  <a:extLst>
+                    <a:ext uri="{9D8B030D-6E8A-4147-A177-3AD203B41FA5}">
+                      <a16:colId xmlns:a16="http://schemas.microsoft.com/office/drawing/2014/main" val="541314728"/>
+                    </a:ext>
+                  </a:extLst>
+                </a:gridCol>
+                <a:gridCol w="1165289">
+                  <a:extLst>
+                    <a:ext uri="{9D8B030D-6E8A-4147-A177-3AD203B41FA5}">
+                      <a16:colId xmlns:a16="http://schemas.microsoft.com/office/drawing/2014/main" val="2640899981"/>
+                    </a:ext>
+                  </a:extLst>
+                </a:gridCol>
+                <a:gridCol w="1165289">
+                  <a:extLst>
+                    <a:ext uri="{9D8B030D-6E8A-4147-A177-3AD203B41FA5}">
+                      <a16:colId xmlns:a16="http://schemas.microsoft.com/office/drawing/2014/main" val="2875271390"/>
+                    </a:ext>
+                  </a:extLst>
+                </a:gridCol>
+                <a:gridCol w="1165289">
+                  <a:extLst>
+                    <a:ext uri="{9D8B030D-6E8A-4147-A177-3AD203B41FA5}">
+                      <a16:colId xmlns:a16="http://schemas.microsoft.com/office/drawing/2014/main" val="2245203884"/>
+                    </a:ext>
+                  </a:extLst>
+                </a:gridCol>
+              </a:tblGrid>
+              <a:tr h="309785">
+                <a:tc>
+                  <a:txBody>
+                    <a:bodyPr/>
+                    <a:lstStyle/>
+                    <a:p>
+                      <a:r>
+                        <a:rPr lang="en-US" sz="1600" noProof="0"/>
+                        <a:t>Activity</a:t>
+                      </a:r>
+                    </a:p>
+                  </a:txBody>
+                  <a:tcPr>
+                    <a:solidFill>
+                      <a:schemeClr val="accent6">
+                        <a:lumMod val="75000"/>
+                      </a:schemeClr>
+                    </a:solidFill>
+                  </a:tcPr>
+                </a:tc>
+                <a:tc>
+                  <a:txBody>
+                    <a:bodyPr/>
+                    <a:lstStyle/>
+                    <a:p>
+                      <a:r>
+                        <a:rPr lang="de-DE" sz="1600" dirty="0"/>
+                        <a:t>TP (Base)</a:t>
+                      </a:r>
+                    </a:p>
+                  </a:txBody>
+                  <a:tcPr>
+                    <a:solidFill>
+                      <a:schemeClr val="accent6">
+                        <a:lumMod val="75000"/>
+                      </a:schemeClr>
+                    </a:solidFill>
+                  </a:tcPr>
+                </a:tc>
+                <a:tc>
+                  <a:txBody>
+                    <a:bodyPr/>
+                    <a:lstStyle/>
+                    <a:p>
+                      <a:r>
+                        <a:rPr lang="de-DE" sz="1600" dirty="0"/>
+                        <a:t>TN (Base)</a:t>
+                      </a:r>
+                    </a:p>
+                  </a:txBody>
+                  <a:tcPr>
+                    <a:solidFill>
+                      <a:schemeClr val="accent6">
+                        <a:lumMod val="75000"/>
+                      </a:schemeClr>
+                    </a:solidFill>
+                  </a:tcPr>
+                </a:tc>
+                <a:tc>
+                  <a:txBody>
+                    <a:bodyPr/>
+                    <a:lstStyle/>
+                    <a:p>
+                      <a:r>
+                        <a:rPr lang="de-DE" sz="1600" dirty="0"/>
+                        <a:t>TP (</a:t>
+                      </a:r>
+                      <a:r>
+                        <a:rPr lang="de-DE" sz="1600" dirty="0" err="1"/>
+                        <a:t>Ours</a:t>
+                      </a:r>
+                      <a:r>
+                        <a:rPr lang="de-DE" sz="1600" dirty="0"/>
+                        <a:t>)</a:t>
+                      </a:r>
+                    </a:p>
+                  </a:txBody>
+                  <a:tcPr>
+                    <a:solidFill>
+                      <a:schemeClr val="accent6">
+                        <a:lumMod val="75000"/>
+                      </a:schemeClr>
+                    </a:solidFill>
+                  </a:tcPr>
+                </a:tc>
+                <a:tc>
+                  <a:txBody>
+                    <a:bodyPr/>
+                    <a:lstStyle/>
+                    <a:p>
+                      <a:r>
+                        <a:rPr lang="de-DE" sz="1600" dirty="0"/>
+                        <a:t>TN (</a:t>
+                      </a:r>
+                      <a:r>
+                        <a:rPr lang="de-DE" sz="1600" dirty="0" err="1"/>
+                        <a:t>Ours</a:t>
+                      </a:r>
+                      <a:r>
+                        <a:rPr lang="de-DE" sz="1600" dirty="0"/>
+                        <a:t>)</a:t>
+                      </a:r>
+                    </a:p>
+                  </a:txBody>
+                  <a:tcPr>
+                    <a:solidFill>
+                      <a:schemeClr val="accent6">
+                        <a:lumMod val="75000"/>
+                      </a:schemeClr>
+                    </a:solidFill>
+                  </a:tcPr>
+                </a:tc>
+                <a:extLst>
+                  <a:ext uri="{0D108BD9-81ED-4DB2-BD59-A6C34878D82A}">
+                    <a16:rowId xmlns:a16="http://schemas.microsoft.com/office/drawing/2014/main" val="3600754082"/>
+                  </a:ext>
+                </a:extLst>
+              </a:tr>
+              <a:tr h="535083">
+                <a:tc>
+                  <a:txBody>
+                    <a:bodyPr/>
+                    <a:lstStyle/>
+                    <a:p>
+                      <a:r>
+                        <a:rPr lang="en-US" sz="1400" b="1" noProof="0"/>
+                        <a:t>Climb Stairs</a:t>
+                      </a:r>
+                    </a:p>
+                  </a:txBody>
+                  <a:tcPr>
+                    <a:solidFill>
+                      <a:schemeClr val="accent6">
+                        <a:lumMod val="60000"/>
+                        <a:lumOff val="40000"/>
+                      </a:schemeClr>
+                    </a:solidFill>
+                  </a:tcPr>
+                </a:tc>
+                <a:tc>
+                  <a:txBody>
+                    <a:bodyPr/>
+                    <a:lstStyle/>
+                    <a:p>
+                      <a:r>
+                        <a:rPr lang="de-DE" sz="1400" dirty="0"/>
+                        <a:t>38.3%</a:t>
+                      </a:r>
+                    </a:p>
+                  </a:txBody>
+                  <a:tcPr>
+                    <a:solidFill>
+                      <a:schemeClr val="accent6">
+                        <a:lumMod val="40000"/>
+                        <a:lumOff val="60000"/>
+                      </a:schemeClr>
+                    </a:solidFill>
+                  </a:tcPr>
+                </a:tc>
+                <a:tc>
+                  <a:txBody>
+                    <a:bodyPr/>
+                    <a:lstStyle/>
+                    <a:p>
+                      <a:r>
+                        <a:rPr lang="de-DE" sz="1400" dirty="0"/>
+                        <a:t>85.78%</a:t>
+                      </a:r>
+                    </a:p>
+                  </a:txBody>
+                  <a:tcPr>
+                    <a:solidFill>
+                      <a:schemeClr val="accent6">
+                        <a:lumMod val="40000"/>
+                        <a:lumOff val="60000"/>
+                      </a:schemeClr>
+                    </a:solidFill>
+                  </a:tcPr>
+                </a:tc>
+                <a:tc>
+                  <a:txBody>
+                    <a:bodyPr/>
+                    <a:lstStyle/>
+                    <a:p>
+                      <a:r>
+                        <a:rPr lang="de-DE" sz="1400" dirty="0"/>
+                        <a:t>95.24%</a:t>
+                      </a:r>
+                    </a:p>
+                  </a:txBody>
+                  <a:tcPr>
+                    <a:solidFill>
+                      <a:schemeClr val="accent6">
+                        <a:lumMod val="40000"/>
+                        <a:lumOff val="60000"/>
+                      </a:schemeClr>
+                    </a:solidFill>
+                  </a:tcPr>
+                </a:tc>
+                <a:tc>
+                  <a:txBody>
+                    <a:bodyPr/>
+                    <a:lstStyle/>
+                    <a:p>
+                      <a:r>
+                        <a:rPr lang="de-DE" sz="1400" dirty="0"/>
+                        <a:t>98.78%</a:t>
+                      </a:r>
+                    </a:p>
+                  </a:txBody>
+                  <a:tcPr>
+                    <a:solidFill>
+                      <a:schemeClr val="accent6">
+                        <a:lumMod val="40000"/>
+                        <a:lumOff val="60000"/>
+                      </a:schemeClr>
+                    </a:solidFill>
+                  </a:tcPr>
+                </a:tc>
+                <a:extLst>
+                  <a:ext uri="{0D108BD9-81ED-4DB2-BD59-A6C34878D82A}">
+                    <a16:rowId xmlns:a16="http://schemas.microsoft.com/office/drawing/2014/main" val="339288744"/>
+                  </a:ext>
+                </a:extLst>
+              </a:tr>
+              <a:tr h="760381">
+                <a:tc>
+                  <a:txBody>
+                    <a:bodyPr/>
+                    <a:lstStyle/>
+                    <a:p>
+                      <a:r>
+                        <a:rPr lang="en-US" sz="1400" b="1" noProof="0"/>
+                        <a:t>Drink Water from a Glass</a:t>
+                      </a:r>
+                    </a:p>
+                  </a:txBody>
+                  <a:tcPr>
+                    <a:solidFill>
+                      <a:schemeClr val="accent6">
+                        <a:lumMod val="60000"/>
+                        <a:lumOff val="40000"/>
+                      </a:schemeClr>
+                    </a:solidFill>
+                  </a:tcPr>
+                </a:tc>
+                <a:tc>
+                  <a:txBody>
+                    <a:bodyPr/>
+                    <a:lstStyle/>
+                    <a:p>
+                      <a:r>
+                        <a:rPr lang="de-DE" sz="1400" dirty="0"/>
+                        <a:t>90.91%</a:t>
+                      </a:r>
+                    </a:p>
+                  </a:txBody>
+                  <a:tcPr>
+                    <a:solidFill>
+                      <a:schemeClr val="accent6">
+                        <a:lumMod val="40000"/>
+                        <a:lumOff val="60000"/>
+                      </a:schemeClr>
+                    </a:solidFill>
+                  </a:tcPr>
+                </a:tc>
+                <a:tc>
+                  <a:txBody>
+                    <a:bodyPr/>
+                    <a:lstStyle/>
+                    <a:p>
+                      <a:r>
+                        <a:rPr lang="de-DE" sz="1400" dirty="0"/>
+                        <a:t>86.59%</a:t>
+                      </a:r>
+                    </a:p>
+                  </a:txBody>
+                  <a:tcPr>
+                    <a:solidFill>
+                      <a:schemeClr val="accent6">
+                        <a:lumMod val="40000"/>
+                        <a:lumOff val="60000"/>
+                      </a:schemeClr>
+                    </a:solidFill>
+                  </a:tcPr>
+                </a:tc>
+                <a:tc>
+                  <a:txBody>
+                    <a:bodyPr/>
+                    <a:lstStyle/>
+                    <a:p>
+                      <a:r>
+                        <a:rPr lang="de-DE" sz="1400" dirty="0"/>
+                        <a:t>90.48%</a:t>
+                      </a:r>
+                    </a:p>
+                  </a:txBody>
+                  <a:tcPr>
+                    <a:solidFill>
+                      <a:schemeClr val="accent6">
+                        <a:lumMod val="40000"/>
+                        <a:lumOff val="60000"/>
+                      </a:schemeClr>
+                    </a:solidFill>
+                  </a:tcPr>
+                </a:tc>
+                <a:tc>
+                  <a:txBody>
+                    <a:bodyPr/>
+                    <a:lstStyle/>
+                    <a:p>
+                      <a:r>
+                        <a:rPr lang="de-DE" sz="1400" dirty="0"/>
+                        <a:t>100%</a:t>
+                      </a:r>
+                    </a:p>
+                  </a:txBody>
+                  <a:tcPr>
+                    <a:solidFill>
+                      <a:schemeClr val="accent6">
+                        <a:lumMod val="40000"/>
+                        <a:lumOff val="60000"/>
+                      </a:schemeClr>
+                    </a:solidFill>
+                  </a:tcPr>
+                </a:tc>
+                <a:extLst>
+                  <a:ext uri="{0D108BD9-81ED-4DB2-BD59-A6C34878D82A}">
+                    <a16:rowId xmlns:a16="http://schemas.microsoft.com/office/drawing/2014/main" val="3908177163"/>
+                  </a:ext>
+                </a:extLst>
+              </a:tr>
+              <a:tr h="309785">
+                <a:tc>
+                  <a:txBody>
+                    <a:bodyPr/>
+                    <a:lstStyle/>
+                    <a:p>
+                      <a:r>
+                        <a:rPr lang="en-US" sz="1400" b="1" noProof="0"/>
+                        <a:t>Pour Water</a:t>
+                      </a:r>
+                    </a:p>
+                  </a:txBody>
+                  <a:tcPr>
+                    <a:solidFill>
+                      <a:schemeClr val="accent6">
+                        <a:lumMod val="60000"/>
+                        <a:lumOff val="40000"/>
+                      </a:schemeClr>
+                    </a:solidFill>
+                  </a:tcPr>
+                </a:tc>
+                <a:tc>
+                  <a:txBody>
+                    <a:bodyPr/>
+                    <a:lstStyle/>
+                    <a:p>
+                      <a:r>
+                        <a:rPr lang="de-DE" sz="1400" dirty="0"/>
+                        <a:t>95%</a:t>
+                      </a:r>
+                    </a:p>
+                  </a:txBody>
+                  <a:tcPr>
+                    <a:solidFill>
+                      <a:schemeClr val="accent6">
+                        <a:lumMod val="40000"/>
+                        <a:lumOff val="60000"/>
+                      </a:schemeClr>
+                    </a:solidFill>
+                  </a:tcPr>
+                </a:tc>
+                <a:tc>
+                  <a:txBody>
+                    <a:bodyPr/>
+                    <a:lstStyle/>
+                    <a:p>
+                      <a:r>
+                        <a:rPr lang="de-DE" sz="1400" dirty="0"/>
+                        <a:t>71.55%</a:t>
+                      </a:r>
+                    </a:p>
+                  </a:txBody>
+                  <a:tcPr>
+                    <a:solidFill>
+                      <a:schemeClr val="accent6">
+                        <a:lumMod val="40000"/>
+                        <a:lumOff val="60000"/>
+                      </a:schemeClr>
+                    </a:solidFill>
+                  </a:tcPr>
+                </a:tc>
+                <a:tc>
+                  <a:txBody>
+                    <a:bodyPr/>
+                    <a:lstStyle/>
+                    <a:p>
+                      <a:r>
+                        <a:rPr lang="de-DE" sz="1400" dirty="0"/>
+                        <a:t>100%</a:t>
+                      </a:r>
+                    </a:p>
+                  </a:txBody>
+                  <a:tcPr>
+                    <a:solidFill>
+                      <a:schemeClr val="accent6">
+                        <a:lumMod val="40000"/>
+                        <a:lumOff val="60000"/>
+                      </a:schemeClr>
+                    </a:solidFill>
+                  </a:tcPr>
+                </a:tc>
+                <a:tc>
+                  <a:txBody>
+                    <a:bodyPr/>
+                    <a:lstStyle/>
+                    <a:p>
+                      <a:r>
+                        <a:rPr lang="de-DE" sz="1400" dirty="0"/>
+                        <a:t>99.63%</a:t>
+                      </a:r>
+                    </a:p>
+                  </a:txBody>
+                  <a:tcPr>
+                    <a:solidFill>
+                      <a:schemeClr val="accent6">
+                        <a:lumMod val="40000"/>
+                        <a:lumOff val="60000"/>
+                      </a:schemeClr>
+                    </a:solidFill>
+                  </a:tcPr>
+                </a:tc>
+                <a:extLst>
+                  <a:ext uri="{0D108BD9-81ED-4DB2-BD59-A6C34878D82A}">
+                    <a16:rowId xmlns:a16="http://schemas.microsoft.com/office/drawing/2014/main" val="1981200641"/>
+                  </a:ext>
+                </a:extLst>
+              </a:tr>
+              <a:tr h="535083">
+                <a:tc>
+                  <a:txBody>
+                    <a:bodyPr/>
+                    <a:lstStyle/>
+                    <a:p>
+                      <a:r>
+                        <a:rPr lang="en-US" sz="1400" b="1" noProof="0"/>
+                        <a:t>Sit down on chair</a:t>
+                      </a:r>
+                    </a:p>
+                  </a:txBody>
+                  <a:tcPr>
+                    <a:solidFill>
+                      <a:schemeClr val="accent6">
+                        <a:lumMod val="60000"/>
+                        <a:lumOff val="40000"/>
+                      </a:schemeClr>
+                    </a:solidFill>
+                  </a:tcPr>
+                </a:tc>
+                <a:tc>
+                  <a:txBody>
+                    <a:bodyPr/>
+                    <a:lstStyle/>
+                    <a:p>
+                      <a:r>
+                        <a:rPr lang="de-DE" sz="1400" dirty="0"/>
+                        <a:t>0%</a:t>
+                      </a:r>
+                    </a:p>
+                  </a:txBody>
+                  <a:tcPr>
+                    <a:solidFill>
+                      <a:schemeClr val="accent6">
+                        <a:lumMod val="40000"/>
+                        <a:lumOff val="60000"/>
+                      </a:schemeClr>
+                    </a:solidFill>
+                  </a:tcPr>
+                </a:tc>
+                <a:tc>
+                  <a:txBody>
+                    <a:bodyPr/>
+                    <a:lstStyle/>
+                    <a:p>
+                      <a:r>
+                        <a:rPr lang="de-DE" sz="1400" dirty="0"/>
+                        <a:t>100%</a:t>
+                      </a:r>
+                    </a:p>
+                  </a:txBody>
+                  <a:tcPr>
+                    <a:solidFill>
+                      <a:schemeClr val="accent6">
+                        <a:lumMod val="40000"/>
+                        <a:lumOff val="60000"/>
+                      </a:schemeClr>
+                    </a:solidFill>
+                  </a:tcPr>
+                </a:tc>
+                <a:tc>
+                  <a:txBody>
+                    <a:bodyPr/>
+                    <a:lstStyle/>
+                    <a:p>
+                      <a:r>
+                        <a:rPr lang="de-DE" sz="1400" dirty="0"/>
+                        <a:t>85.71%</a:t>
+                      </a:r>
+                    </a:p>
+                  </a:txBody>
+                  <a:tcPr>
+                    <a:solidFill>
+                      <a:schemeClr val="accent6">
+                        <a:lumMod val="40000"/>
+                        <a:lumOff val="60000"/>
+                      </a:schemeClr>
+                    </a:solidFill>
+                  </a:tcPr>
+                </a:tc>
+                <a:tc>
+                  <a:txBody>
+                    <a:bodyPr/>
+                    <a:lstStyle/>
+                    <a:p>
+                      <a:r>
+                        <a:rPr lang="de-DE" sz="1400" dirty="0"/>
+                        <a:t>98.72%</a:t>
+                      </a:r>
+                    </a:p>
+                  </a:txBody>
+                  <a:tcPr>
+                    <a:solidFill>
+                      <a:schemeClr val="accent6">
+                        <a:lumMod val="40000"/>
+                        <a:lumOff val="60000"/>
+                      </a:schemeClr>
+                    </a:solidFill>
+                  </a:tcPr>
+                </a:tc>
+                <a:extLst>
+                  <a:ext uri="{0D108BD9-81ED-4DB2-BD59-A6C34878D82A}">
+                    <a16:rowId xmlns:a16="http://schemas.microsoft.com/office/drawing/2014/main" val="1367658910"/>
+                  </a:ext>
+                </a:extLst>
+              </a:tr>
+              <a:tr h="591407">
+                <a:tc>
+                  <a:txBody>
+                    <a:bodyPr/>
+                    <a:lstStyle/>
+                    <a:p>
+                      <a:r>
+                        <a:rPr lang="en-US" sz="1400" b="1" noProof="0" dirty="0"/>
+                        <a:t>Stand up from chair</a:t>
+                      </a:r>
+                    </a:p>
+                  </a:txBody>
+                  <a:tcPr>
+                    <a:solidFill>
+                      <a:schemeClr val="accent6">
+                        <a:lumMod val="60000"/>
+                        <a:lumOff val="40000"/>
+                      </a:schemeClr>
+                    </a:solidFill>
+                  </a:tcPr>
+                </a:tc>
+                <a:tc>
+                  <a:txBody>
+                    <a:bodyPr/>
+                    <a:lstStyle/>
+                    <a:p>
+                      <a:r>
+                        <a:rPr lang="de-DE" sz="1400" dirty="0"/>
+                        <a:t>35.71%</a:t>
+                      </a:r>
+                    </a:p>
+                  </a:txBody>
+                  <a:tcPr>
+                    <a:solidFill>
+                      <a:schemeClr val="accent6">
+                        <a:lumMod val="40000"/>
+                        <a:lumOff val="60000"/>
+                      </a:schemeClr>
+                    </a:solidFill>
+                  </a:tcPr>
+                </a:tc>
+                <a:tc>
+                  <a:txBody>
+                    <a:bodyPr/>
+                    <a:lstStyle/>
+                    <a:p>
+                      <a:r>
+                        <a:rPr lang="de-DE" sz="1400" dirty="0"/>
+                        <a:t>93.96%</a:t>
+                      </a:r>
+                    </a:p>
+                  </a:txBody>
+                  <a:tcPr>
+                    <a:solidFill>
+                      <a:schemeClr val="accent6">
+                        <a:lumMod val="40000"/>
+                        <a:lumOff val="60000"/>
+                      </a:schemeClr>
+                    </a:solidFill>
+                  </a:tcPr>
+                </a:tc>
+                <a:tc>
+                  <a:txBody>
+                    <a:bodyPr/>
+                    <a:lstStyle/>
+                    <a:p>
+                      <a:r>
+                        <a:rPr lang="de-DE" sz="1400" dirty="0"/>
+                        <a:t>100%</a:t>
+                      </a:r>
+                    </a:p>
+                  </a:txBody>
+                  <a:tcPr>
+                    <a:solidFill>
+                      <a:schemeClr val="accent6">
+                        <a:lumMod val="40000"/>
+                        <a:lumOff val="60000"/>
+                      </a:schemeClr>
+                    </a:solidFill>
+                  </a:tcPr>
+                </a:tc>
+                <a:tc>
+                  <a:txBody>
+                    <a:bodyPr/>
+                    <a:lstStyle/>
+                    <a:p>
+                      <a:r>
+                        <a:rPr lang="de-DE" sz="1400" dirty="0"/>
+                        <a:t>98.17%</a:t>
+                      </a:r>
+                    </a:p>
+                  </a:txBody>
+                  <a:tcPr>
+                    <a:solidFill>
+                      <a:schemeClr val="accent6">
+                        <a:lumMod val="40000"/>
+                        <a:lumOff val="60000"/>
+                      </a:schemeClr>
+                    </a:solidFill>
+                  </a:tcPr>
+                </a:tc>
+                <a:extLst>
+                  <a:ext uri="{0D108BD9-81ED-4DB2-BD59-A6C34878D82A}">
+                    <a16:rowId xmlns:a16="http://schemas.microsoft.com/office/drawing/2014/main" val="2091041650"/>
+                  </a:ext>
+                </a:extLst>
+              </a:tr>
+            </a:tbl>
+          </a:graphicData>
+        </a:graphic>
+      </p:graphicFrame>
     </p:spTree>
     <p:extLst>
       <p:ext uri="{BB962C8B-B14F-4D97-AF65-F5344CB8AC3E}">

</xml_diff>

<commit_message>
Added presentation as pdf
</commit_message>
<xml_diff>
--- a/Activities of Daily Living-recognition-with-wrist-worn-accelerometer.pptx
+++ b/Activities of Daily Living-recognition-with-wrist-worn-accelerometer.pptx
@@ -3307,7 +3307,7 @@
           <a:p>
             <a:fld id="{360CA529-25A5-4D4C-AD42-63295B410EC8}" type="datetimeFigureOut">
               <a:rPr lang="de-DE" smtClean="0"/>
-              <a:t>26.08.2023</a:t>
+              <a:t>27.08.2023</a:t>
             </a:fld>
             <a:endParaRPr lang="de-DE"/>
           </a:p>
@@ -3505,7 +3505,7 @@
           <a:p>
             <a:fld id="{360CA529-25A5-4D4C-AD42-63295B410EC8}" type="datetimeFigureOut">
               <a:rPr lang="de-DE" smtClean="0"/>
-              <a:t>26.08.2023</a:t>
+              <a:t>27.08.2023</a:t>
             </a:fld>
             <a:endParaRPr lang="de-DE"/>
           </a:p>
@@ -3713,7 +3713,7 @@
           <a:p>
             <a:fld id="{360CA529-25A5-4D4C-AD42-63295B410EC8}" type="datetimeFigureOut">
               <a:rPr lang="de-DE" smtClean="0"/>
-              <a:t>26.08.2023</a:t>
+              <a:t>27.08.2023</a:t>
             </a:fld>
             <a:endParaRPr lang="de-DE"/>
           </a:p>
@@ -3911,7 +3911,7 @@
           <a:p>
             <a:fld id="{360CA529-25A5-4D4C-AD42-63295B410EC8}" type="datetimeFigureOut">
               <a:rPr lang="de-DE" smtClean="0"/>
-              <a:t>26.08.2023</a:t>
+              <a:t>27.08.2023</a:t>
             </a:fld>
             <a:endParaRPr lang="de-DE"/>
           </a:p>
@@ -4186,7 +4186,7 @@
           <a:p>
             <a:fld id="{360CA529-25A5-4D4C-AD42-63295B410EC8}" type="datetimeFigureOut">
               <a:rPr lang="de-DE" smtClean="0"/>
-              <a:t>26.08.2023</a:t>
+              <a:t>27.08.2023</a:t>
             </a:fld>
             <a:endParaRPr lang="de-DE"/>
           </a:p>
@@ -4451,7 +4451,7 @@
           <a:p>
             <a:fld id="{360CA529-25A5-4D4C-AD42-63295B410EC8}" type="datetimeFigureOut">
               <a:rPr lang="de-DE" smtClean="0"/>
-              <a:t>26.08.2023</a:t>
+              <a:t>27.08.2023</a:t>
             </a:fld>
             <a:endParaRPr lang="de-DE"/>
           </a:p>
@@ -4863,7 +4863,7 @@
           <a:p>
             <a:fld id="{360CA529-25A5-4D4C-AD42-63295B410EC8}" type="datetimeFigureOut">
               <a:rPr lang="de-DE" smtClean="0"/>
-              <a:t>26.08.2023</a:t>
+              <a:t>27.08.2023</a:t>
             </a:fld>
             <a:endParaRPr lang="de-DE"/>
           </a:p>
@@ -5004,7 +5004,7 @@
           <a:p>
             <a:fld id="{360CA529-25A5-4D4C-AD42-63295B410EC8}" type="datetimeFigureOut">
               <a:rPr lang="de-DE" smtClean="0"/>
-              <a:t>26.08.2023</a:t>
+              <a:t>27.08.2023</a:t>
             </a:fld>
             <a:endParaRPr lang="de-DE"/>
           </a:p>
@@ -5117,7 +5117,7 @@
           <a:p>
             <a:fld id="{360CA529-25A5-4D4C-AD42-63295B410EC8}" type="datetimeFigureOut">
               <a:rPr lang="de-DE" smtClean="0"/>
-              <a:t>26.08.2023</a:t>
+              <a:t>27.08.2023</a:t>
             </a:fld>
             <a:endParaRPr lang="de-DE"/>
           </a:p>
@@ -5428,7 +5428,7 @@
           <a:p>
             <a:fld id="{360CA529-25A5-4D4C-AD42-63295B410EC8}" type="datetimeFigureOut">
               <a:rPr lang="de-DE" smtClean="0"/>
-              <a:t>26.08.2023</a:t>
+              <a:t>27.08.2023</a:t>
             </a:fld>
             <a:endParaRPr lang="de-DE"/>
           </a:p>
@@ -5716,7 +5716,7 @@
           <a:p>
             <a:fld id="{360CA529-25A5-4D4C-AD42-63295B410EC8}" type="datetimeFigureOut">
               <a:rPr lang="de-DE" smtClean="0"/>
-              <a:t>26.08.2023</a:t>
+              <a:t>27.08.2023</a:t>
             </a:fld>
             <a:endParaRPr lang="de-DE"/>
           </a:p>
@@ -5957,7 +5957,7 @@
           <a:p>
             <a:fld id="{360CA529-25A5-4D4C-AD42-63295B410EC8}" type="datetimeFigureOut">
               <a:rPr lang="de-DE" smtClean="0"/>
-              <a:t>26.08.2023</a:t>
+              <a:t>27.08.2023</a:t>
             </a:fld>
             <a:endParaRPr lang="de-DE"/>
           </a:p>
@@ -13506,7 +13506,7 @@
                   <a:schemeClr val="tx2"/>
                 </a:solidFill>
               </a:rPr>
-              <a:t>Wrist-Worn</a:t>
+              <a:t>Wrist-worn</a:t>
             </a:r>
             <a:r>
               <a:rPr lang="de-DE" sz="4400" b="1" dirty="0">
@@ -13551,7 +13551,7 @@
         <p:spPr>
           <a:xfrm>
             <a:off x="3215729" y="4165152"/>
-            <a:ext cx="5760846" cy="682079"/>
+            <a:ext cx="5760846" cy="820916"/>
           </a:xfrm>
         </p:spPr>
         <p:txBody>
@@ -13609,6 +13609,14 @@
             </a:endParaRPr>
           </a:p>
           <a:p>
+            <a:r>
+              <a:rPr lang="en-US" sz="1100" b="1" dirty="0">
+                <a:solidFill>
+                  <a:schemeClr val="tx2"/>
+                </a:solidFill>
+              </a:rPr>
+              <a:t>Students: </a:t>
+            </a:r>
             <a:r>
               <a:rPr lang="en-US" sz="1100" dirty="0" err="1">
                 <a:solidFill>
@@ -21025,7 +21033,7 @@
         </p:nvSpPr>
         <p:spPr>
           <a:xfrm>
-            <a:off x="3215424" y="1289954"/>
+            <a:off x="3215424" y="1257842"/>
             <a:ext cx="5760846" cy="2310312"/>
           </a:xfrm>
         </p:spPr>
@@ -21083,8 +21091,8 @@
         </p:blipFill>
         <p:spPr>
           <a:xfrm>
-            <a:off x="5397108" y="5322498"/>
-            <a:ext cx="1397478" cy="1397478"/>
+            <a:off x="5239033" y="4059401"/>
+            <a:ext cx="1713628" cy="1713628"/>
           </a:xfrm>
           <a:prstGeom prst="rect">
             <a:avLst/>
@@ -21105,8 +21113,8 @@
         </p:nvSpPr>
         <p:spPr>
           <a:xfrm>
-            <a:off x="6794586" y="5318514"/>
-            <a:ext cx="1526876" cy="523220"/>
+            <a:off x="5021216" y="5773029"/>
+            <a:ext cx="2149262" cy="307777"/>
           </a:xfrm>
           <a:prstGeom prst="rect">
             <a:avLst/>
@@ -21120,27 +21128,51 @@
           <a:lstStyle/>
           <a:p>
             <a:r>
-              <a:rPr lang="de-DE" sz="1400" i="1" dirty="0" err="1"/>
+              <a:rPr lang="de-DE" sz="1400" i="1" dirty="0" err="1">
+                <a:solidFill>
+                  <a:srgbClr val="44546A"/>
+                </a:solidFill>
+              </a:rPr>
               <a:t>You</a:t>
             </a:r>
             <a:r>
-              <a:rPr lang="de-DE" sz="1400" i="1" dirty="0"/>
+              <a:rPr lang="de-DE" sz="1400" i="1" dirty="0">
+                <a:solidFill>
+                  <a:srgbClr val="44546A"/>
+                </a:solidFill>
+              </a:rPr>
               <a:t> </a:t>
             </a:r>
             <a:r>
-              <a:rPr lang="de-DE" sz="1400" i="1" dirty="0" err="1"/>
+              <a:rPr lang="de-DE" sz="1400" i="1" dirty="0" err="1">
+                <a:solidFill>
+                  <a:srgbClr val="44546A"/>
+                </a:solidFill>
+              </a:rPr>
               <a:t>can</a:t>
             </a:r>
             <a:r>
-              <a:rPr lang="de-DE" sz="1400" i="1" dirty="0"/>
+              <a:rPr lang="de-DE" sz="1400" i="1" dirty="0">
+                <a:solidFill>
+                  <a:srgbClr val="44546A"/>
+                </a:solidFill>
+              </a:rPr>
               <a:t> find </a:t>
             </a:r>
             <a:r>
-              <a:rPr lang="de-DE" sz="1400" i="1" dirty="0" err="1"/>
+              <a:rPr lang="de-DE" sz="1400" i="1" dirty="0" err="1">
+                <a:solidFill>
+                  <a:srgbClr val="44546A"/>
+                </a:solidFill>
+              </a:rPr>
               <a:t>us</a:t>
             </a:r>
             <a:r>
-              <a:rPr lang="de-DE" sz="1400" i="1" dirty="0"/>
+              <a:rPr lang="de-DE" sz="1400" i="1" dirty="0">
+                <a:solidFill>
+                  <a:srgbClr val="44546A"/>
+                </a:solidFill>
+              </a:rPr>
               <a:t> on GitHub!</a:t>
             </a:r>
           </a:p>
@@ -25838,7 +25870,7 @@
           <a:p>
             <a:pPr algn="ctr"/>
             <a:r>
-              <a:rPr lang="de-DE" sz="3600" b="1" dirty="0">
+              <a:rPr lang="de-DE" sz="3600" dirty="0">
                 <a:solidFill>
                   <a:schemeClr val="tx2"/>
                 </a:solidFill>
@@ -28031,6 +28063,246 @@
               <a:t>otion Primitives</a:t>
             </a:r>
             <a:endParaRPr lang="de-DE" b="1" dirty="0"/>
+          </a:p>
+        </p:txBody>
+      </p:sp>
+      <p:sp>
+        <p:nvSpPr>
+          <p:cNvPr id="3" name="TextBox 2">
+            <a:extLst>
+              <a:ext uri="{FF2B5EF4-FFF2-40B4-BE49-F238E27FC236}">
+                <a16:creationId xmlns:a16="http://schemas.microsoft.com/office/drawing/2014/main" id="{D884BE1A-9895-B941-AF11-15217659BFAB}"/>
+              </a:ext>
+            </a:extLst>
+          </p:cNvPr>
+          <p:cNvSpPr txBox="1"/>
+          <p:nvPr/>
+        </p:nvSpPr>
+        <p:spPr>
+          <a:xfrm>
+            <a:off x="-20497" y="6514003"/>
+            <a:ext cx="4535961" cy="338554"/>
+          </a:xfrm>
+          <a:prstGeom prst="rect">
+            <a:avLst/>
+          </a:prstGeom>
+          <a:noFill/>
+        </p:spPr>
+        <p:txBody>
+          <a:bodyPr wrap="square" rtlCol="0">
+            <a:spAutoFit/>
+          </a:bodyPr>
+          <a:lstStyle/>
+          <a:p>
+            <a:r>
+              <a:rPr lang="de-DE" sz="800" dirty="0">
+                <a:solidFill>
+                  <a:schemeClr val="tx2"/>
+                </a:solidFill>
+                <a:latin typeface="+mj-lt"/>
+                <a:ea typeface="+mj-ea"/>
+                <a:cs typeface="+mj-cs"/>
+              </a:rPr>
+              <a:t>[1] Barbara Bruno et al. “Analysis </a:t>
+            </a:r>
+            <a:r>
+              <a:rPr lang="de-DE" sz="800" dirty="0" err="1">
+                <a:solidFill>
+                  <a:schemeClr val="tx2"/>
+                </a:solidFill>
+                <a:latin typeface="+mj-lt"/>
+                <a:ea typeface="+mj-ea"/>
+                <a:cs typeface="+mj-cs"/>
+              </a:rPr>
+              <a:t>of</a:t>
+            </a:r>
+            <a:r>
+              <a:rPr lang="de-DE" sz="800" dirty="0">
+                <a:solidFill>
+                  <a:schemeClr val="tx2"/>
+                </a:solidFill>
+                <a:latin typeface="+mj-lt"/>
+                <a:ea typeface="+mj-ea"/>
+                <a:cs typeface="+mj-cs"/>
+              </a:rPr>
+              <a:t> human </a:t>
+            </a:r>
+            <a:r>
+              <a:rPr lang="de-DE" sz="800" dirty="0" err="1">
+                <a:solidFill>
+                  <a:schemeClr val="tx2"/>
+                </a:solidFill>
+                <a:latin typeface="+mj-lt"/>
+                <a:ea typeface="+mj-ea"/>
+                <a:cs typeface="+mj-cs"/>
+              </a:rPr>
+              <a:t>behavior</a:t>
+            </a:r>
+            <a:r>
+              <a:rPr lang="de-DE" sz="800" dirty="0">
+                <a:solidFill>
+                  <a:schemeClr val="tx2"/>
+                </a:solidFill>
+                <a:latin typeface="+mj-lt"/>
+                <a:ea typeface="+mj-ea"/>
+                <a:cs typeface="+mj-cs"/>
+              </a:rPr>
+              <a:t> </a:t>
+            </a:r>
+            <a:r>
+              <a:rPr lang="de-DE" sz="800" dirty="0" err="1">
+                <a:solidFill>
+                  <a:schemeClr val="tx2"/>
+                </a:solidFill>
+                <a:latin typeface="+mj-lt"/>
+                <a:ea typeface="+mj-ea"/>
+                <a:cs typeface="+mj-cs"/>
+              </a:rPr>
+              <a:t>recognition</a:t>
+            </a:r>
+            <a:r>
+              <a:rPr lang="de-DE" sz="800" dirty="0">
+                <a:solidFill>
+                  <a:schemeClr val="tx2"/>
+                </a:solidFill>
+                <a:latin typeface="+mj-lt"/>
+                <a:ea typeface="+mj-ea"/>
+                <a:cs typeface="+mj-cs"/>
+              </a:rPr>
+              <a:t> </a:t>
+            </a:r>
+            <a:r>
+              <a:rPr lang="de-DE" sz="800" dirty="0" err="1">
+                <a:solidFill>
+                  <a:schemeClr val="tx2"/>
+                </a:solidFill>
+                <a:latin typeface="+mj-lt"/>
+                <a:ea typeface="+mj-ea"/>
+                <a:cs typeface="+mj-cs"/>
+              </a:rPr>
+              <a:t>algorithms</a:t>
+            </a:r>
+            <a:r>
+              <a:rPr lang="de-DE" sz="800" dirty="0">
+                <a:solidFill>
+                  <a:schemeClr val="tx2"/>
+                </a:solidFill>
+                <a:latin typeface="+mj-lt"/>
+                <a:ea typeface="+mj-ea"/>
+                <a:cs typeface="+mj-cs"/>
+              </a:rPr>
+              <a:t> </a:t>
+            </a:r>
+            <a:r>
+              <a:rPr lang="de-DE" sz="800" dirty="0" err="1">
+                <a:solidFill>
+                  <a:schemeClr val="tx2"/>
+                </a:solidFill>
+                <a:latin typeface="+mj-lt"/>
+                <a:ea typeface="+mj-ea"/>
+                <a:cs typeface="+mj-cs"/>
+              </a:rPr>
+              <a:t>based</a:t>
+            </a:r>
+            <a:r>
+              <a:rPr lang="de-DE" sz="800" dirty="0">
+                <a:solidFill>
+                  <a:schemeClr val="tx2"/>
+                </a:solidFill>
+                <a:latin typeface="+mj-lt"/>
+                <a:ea typeface="+mj-ea"/>
+                <a:cs typeface="+mj-cs"/>
+              </a:rPr>
+              <a:t> on </a:t>
+            </a:r>
+            <a:r>
+              <a:rPr lang="de-DE" sz="800" dirty="0" err="1">
+                <a:solidFill>
+                  <a:schemeClr val="tx2"/>
+                </a:solidFill>
+                <a:latin typeface="+mj-lt"/>
+                <a:ea typeface="+mj-ea"/>
+                <a:cs typeface="+mj-cs"/>
+              </a:rPr>
+              <a:t>acceleration</a:t>
+            </a:r>
+            <a:r>
+              <a:rPr lang="de-DE" sz="800" dirty="0">
+                <a:solidFill>
+                  <a:schemeClr val="tx2"/>
+                </a:solidFill>
+                <a:latin typeface="+mj-lt"/>
+                <a:ea typeface="+mj-ea"/>
+                <a:cs typeface="+mj-cs"/>
+              </a:rPr>
+              <a:t> </a:t>
+            </a:r>
+            <a:r>
+              <a:rPr lang="de-DE" sz="800" dirty="0" err="1">
+                <a:solidFill>
+                  <a:schemeClr val="tx2"/>
+                </a:solidFill>
+                <a:latin typeface="+mj-lt"/>
+                <a:ea typeface="+mj-ea"/>
+                <a:cs typeface="+mj-cs"/>
+              </a:rPr>
+              <a:t>data</a:t>
+            </a:r>
+            <a:r>
+              <a:rPr lang="de-DE" sz="800" dirty="0">
+                <a:solidFill>
+                  <a:schemeClr val="tx2"/>
+                </a:solidFill>
+                <a:latin typeface="+mj-lt"/>
+                <a:ea typeface="+mj-ea"/>
+                <a:cs typeface="+mj-cs"/>
+              </a:rPr>
+              <a:t>”. In: May 2013, pp. 1602– 1607. </a:t>
+            </a:r>
+            <a:r>
+              <a:rPr lang="de-DE" sz="800" dirty="0" err="1">
+                <a:solidFill>
+                  <a:schemeClr val="tx2"/>
+                </a:solidFill>
+                <a:latin typeface="+mj-lt"/>
+                <a:ea typeface="+mj-ea"/>
+                <a:cs typeface="+mj-cs"/>
+              </a:rPr>
+              <a:t>isbn</a:t>
+            </a:r>
+            <a:r>
+              <a:rPr lang="de-DE" sz="800" dirty="0">
+                <a:solidFill>
+                  <a:schemeClr val="tx2"/>
+                </a:solidFill>
+                <a:latin typeface="+mj-lt"/>
+                <a:ea typeface="+mj-ea"/>
+                <a:cs typeface="+mj-cs"/>
+              </a:rPr>
+              <a:t>: 978-1-4673-5641-1. </a:t>
+            </a:r>
+            <a:r>
+              <a:rPr lang="de-DE" sz="800" dirty="0" err="1">
+                <a:solidFill>
+                  <a:schemeClr val="tx2"/>
+                </a:solidFill>
+                <a:latin typeface="+mj-lt"/>
+                <a:ea typeface="+mj-ea"/>
+                <a:cs typeface="+mj-cs"/>
+              </a:rPr>
+              <a:t>doi</a:t>
+            </a:r>
+            <a:r>
+              <a:rPr lang="de-DE" sz="800" dirty="0">
+                <a:solidFill>
+                  <a:schemeClr val="tx2"/>
+                </a:solidFill>
+                <a:latin typeface="+mj-lt"/>
+                <a:ea typeface="+mj-ea"/>
+                <a:cs typeface="+mj-cs"/>
+              </a:rPr>
+              <a:t>: 10.1109/ICRA.2013.6630784</a:t>
+            </a:r>
           </a:p>
         </p:txBody>
       </p:sp>
@@ -29305,7 +29577,11 @@
           <a:lstStyle/>
           <a:p>
             <a:r>
-              <a:rPr lang="en-US" b="1" dirty="0"/>
+              <a:rPr lang="en-US" b="1" dirty="0">
+                <a:solidFill>
+                  <a:srgbClr val="44546A"/>
+                </a:solidFill>
+              </a:rPr>
               <a:t>The Dataset for ADL Recognition with Wrist-worn Accelerometer </a:t>
             </a:r>
           </a:p>
@@ -29314,7 +29590,11 @@
               <a:buFont typeface="Arial" panose="020B0604020202020204" pitchFamily="34" charset="0"/>
               <a:buChar char="•"/>
             </a:pPr>
-            <a:endParaRPr lang="en-US" dirty="0"/>
+            <a:endParaRPr lang="en-US" dirty="0">
+              <a:solidFill>
+                <a:srgbClr val="44546A"/>
+              </a:solidFill>
+            </a:endParaRPr>
           </a:p>
           <a:p>
             <a:pPr marL="285750" indent="-285750">
@@ -29322,14 +29602,26 @@
               <a:buChar char="•"/>
             </a:pPr>
             <a:r>
-              <a:rPr lang="en-US" dirty="0"/>
+              <a:rPr lang="en-US" dirty="0">
+                <a:solidFill>
+                  <a:srgbClr val="44546A"/>
+                </a:solidFill>
+              </a:rPr>
               <a:t>Labelled accelerometer data recordings available for public usage</a:t>
             </a:r>
             <a:br>
-              <a:rPr lang="en-US" dirty="0"/>
+              <a:rPr lang="en-US" dirty="0">
+                <a:solidFill>
+                  <a:srgbClr val="44546A"/>
+                </a:solidFill>
+              </a:rPr>
             </a:br>
             <a:r>
-              <a:rPr lang="en-US" dirty="0"/>
+              <a:rPr lang="en-US" dirty="0">
+                <a:solidFill>
+                  <a:srgbClr val="44546A"/>
+                </a:solidFill>
+              </a:rPr>
               <a:t>for creation or validation of acceleration models </a:t>
             </a:r>
           </a:p>
@@ -29338,7 +29630,11 @@
               <a:buFont typeface="Arial" panose="020B0604020202020204" pitchFamily="34" charset="0"/>
               <a:buChar char="•"/>
             </a:pPr>
-            <a:endParaRPr lang="en-US" dirty="0"/>
+            <a:endParaRPr lang="en-US" dirty="0">
+              <a:solidFill>
+                <a:srgbClr val="44546A"/>
+              </a:solidFill>
+            </a:endParaRPr>
           </a:p>
           <a:p>
             <a:pPr marL="285750" indent="-285750">
@@ -29346,7 +29642,11 @@
               <a:buChar char="•"/>
             </a:pPr>
             <a:r>
-              <a:rPr lang="en-US" dirty="0"/>
+              <a:rPr lang="en-US" dirty="0">
+                <a:solidFill>
+                  <a:srgbClr val="44546A"/>
+                </a:solidFill>
+              </a:rPr>
               <a:t>16 different volunteers recorded their performance of simple daily activities </a:t>
             </a:r>
           </a:p>
@@ -29356,7 +29656,11 @@
               <a:buChar char="•"/>
             </a:pPr>
             <a:r>
-              <a:rPr lang="en-US" dirty="0"/>
+              <a:rPr lang="en-US" dirty="0">
+                <a:solidFill>
+                  <a:srgbClr val="44546A"/>
+                </a:solidFill>
+              </a:rPr>
               <a:t>14 activities</a:t>
             </a:r>
           </a:p>
@@ -29366,7 +29670,11 @@
               <a:buChar char="•"/>
             </a:pPr>
             <a:r>
-              <a:rPr lang="en-US" dirty="0"/>
+              <a:rPr lang="en-US" dirty="0">
+                <a:solidFill>
+                  <a:srgbClr val="44546A"/>
+                </a:solidFill>
+              </a:rPr>
               <a:t>Examples: walking, brushing teeth, eating soup etc.</a:t>
             </a:r>
           </a:p>
@@ -29376,12 +29684,20 @@
               <a:buChar char="•"/>
             </a:pPr>
             <a:r>
-              <a:rPr lang="en-US" dirty="0"/>
+              <a:rPr lang="en-US" dirty="0">
+                <a:solidFill>
+                  <a:srgbClr val="44546A"/>
+                </a:solidFill>
+              </a:rPr>
               <a:t>Collected by one tri-axial accelerometer on the right-wrist of the volunteer</a:t>
             </a:r>
           </a:p>
           <a:p>
-            <a:endParaRPr lang="en-US" dirty="0"/>
+            <a:endParaRPr lang="en-US" dirty="0">
+              <a:solidFill>
+                <a:srgbClr val="44546A"/>
+              </a:solidFill>
+            </a:endParaRPr>
           </a:p>
           <a:p>
             <a:pPr marL="285750" indent="-285750">
@@ -29389,14 +29705,26 @@
               <a:buChar char="•"/>
             </a:pPr>
             <a:r>
-              <a:rPr lang="en-US" b="1" dirty="0"/>
+              <a:rPr lang="en-US" b="1" dirty="0">
+                <a:solidFill>
+                  <a:srgbClr val="44546A"/>
+                </a:solidFill>
+              </a:rPr>
               <a:t>Idea: </a:t>
             </a:r>
             <a:r>
-              <a:rPr lang="en-US" dirty="0"/>
+              <a:rPr lang="en-US" dirty="0">
+                <a:solidFill>
+                  <a:srgbClr val="44546A"/>
+                </a:solidFill>
+              </a:rPr>
               <a:t>Create a public testbench for a better comparison of human motion primitives detection algorithms </a:t>
             </a:r>
-            <a:endParaRPr lang="de-DE" dirty="0"/>
+            <a:endParaRPr lang="de-DE" dirty="0">
+              <a:solidFill>
+                <a:srgbClr val="44546A"/>
+              </a:solidFill>
+            </a:endParaRPr>
           </a:p>
         </p:txBody>
       </p:sp>
@@ -29965,8 +30293,8 @@
             <a:chExt cx="6509060" cy="5022889"/>
           </a:xfrm>
         </p:grpSpPr>
-        <mc:AlternateContent xmlns:mc="http://schemas.openxmlformats.org/markup-compatibility/2006" xmlns:a14="http://schemas.microsoft.com/office/drawing/2010/main">
-          <mc:Choice Requires="a14">
+        <mc:AlternateContent xmlns:mc="http://schemas.openxmlformats.org/markup-compatibility/2006">
+          <mc:Choice xmlns:a14="http://schemas.microsoft.com/office/drawing/2010/main" Requires="a14">
             <p:sp>
               <p:nvSpPr>
                 <p:cNvPr id="4" name="Rechteck 3">
@@ -30032,28 +30360,12 @@
                             </m:ctrlPr>
                           </m:sSupPr>
                           <m:e>
-                            <m:groupChr>
-                              <m:groupChrPr>
-                                <m:chr m:val="→"/>
-                                <m:pos m:val="top"/>
-                                <m:ctrlPr>
-                                  <a:rPr lang="de-DE" i="1">
-                                    <a:latin typeface="Cambria Math" panose="02040503050406030204" pitchFamily="18" charset="0"/>
-                                  </a:rPr>
-                                </m:ctrlPr>
-                              </m:groupChrPr>
-                              <m:e>
-                                <m:r>
-                                  <m:rPr>
-                                    <m:brk m:alnAt="1"/>
-                                  </m:rPr>
-                                  <a:rPr lang="de-DE" i="1">
-                                    <a:latin typeface="Cambria Math" panose="02040503050406030204" pitchFamily="18" charset="0"/>
-                                  </a:rPr>
-                                  <m:t>𝐴</m:t>
-                                </m:r>
-                              </m:e>
-                            </m:groupChr>
+                            <m:r>
+                              <a:rPr lang="de-DE" b="0" i="1" smtClean="0">
+                                <a:latin typeface="Cambria Math" panose="02040503050406030204" pitchFamily="18" charset="0"/>
+                              </a:rPr>
+                              <m:t>𝐴</m:t>
+                            </m:r>
                           </m:e>
                           <m:sup>
                             <m:r>
@@ -30072,7 +30384,7 @@
               </p:txBody>
             </p:sp>
           </mc:Choice>
-          <mc:Fallback xmlns="">
+          <mc:Fallback>
             <p:sp>
               <p:nvSpPr>
                 <p:cNvPr id="4" name="Rechteck 3">
@@ -30098,7 +30410,7 @@
                 <a:blipFill>
                   <a:blip r:embed="rId8"/>
                   <a:stretch>
-                    <a:fillRect l="-19388" t="-18462" r="-6122" b="-33846"/>
+                    <a:fillRect/>
                   </a:stretch>
                 </a:blipFill>
                 <a:ln w="9525" cap="flat" cmpd="sng" algn="ctr">
@@ -30126,8 +30438,8 @@
             </p:sp>
           </mc:Fallback>
         </mc:AlternateContent>
-        <mc:AlternateContent xmlns:mc="http://schemas.openxmlformats.org/markup-compatibility/2006" xmlns:a14="http://schemas.microsoft.com/office/drawing/2010/main">
-          <mc:Choice Requires="a14">
+        <mc:AlternateContent xmlns:mc="http://schemas.openxmlformats.org/markup-compatibility/2006">
+          <mc:Choice xmlns:a14="http://schemas.microsoft.com/office/drawing/2010/main" Requires="a14">
             <p:sp>
               <p:nvSpPr>
                 <p:cNvPr id="5" name="Rechteck 4">
@@ -30187,34 +30499,18 @@
                         <m:sSup>
                           <m:sSupPr>
                             <m:ctrlPr>
-                              <a:rPr lang="de-DE" i="1">
+                              <a:rPr lang="de-DE" i="1" smtClean="0">
                                 <a:latin typeface="Cambria Math" panose="02040503050406030204" pitchFamily="18" charset="0"/>
                               </a:rPr>
                             </m:ctrlPr>
                           </m:sSupPr>
                           <m:e>
-                            <m:groupChr>
-                              <m:groupChrPr>
-                                <m:chr m:val="→"/>
-                                <m:pos m:val="top"/>
-                                <m:ctrlPr>
-                                  <a:rPr lang="de-DE" i="1">
-                                    <a:latin typeface="Cambria Math" panose="02040503050406030204" pitchFamily="18" charset="0"/>
-                                  </a:rPr>
-                                </m:ctrlPr>
-                              </m:groupChrPr>
-                              <m:e>
-                                <m:r>
-                                  <m:rPr>
-                                    <m:brk m:alnAt="1"/>
-                                  </m:rPr>
-                                  <a:rPr lang="de-DE" i="1">
-                                    <a:latin typeface="Cambria Math" panose="02040503050406030204" pitchFamily="18" charset="0"/>
-                                  </a:rPr>
-                                  <m:t>𝐴</m:t>
-                                </m:r>
-                              </m:e>
-                            </m:groupChr>
+                            <m:r>
+                              <a:rPr lang="de-DE" b="0" i="1" smtClean="0">
+                                <a:latin typeface="Cambria Math" panose="02040503050406030204" pitchFamily="18" charset="0"/>
+                              </a:rPr>
+                              <m:t>𝐴</m:t>
+                            </m:r>
                           </m:e>
                           <m:sup>
                             <m:r>
@@ -30233,7 +30529,7 @@
               </p:txBody>
             </p:sp>
           </mc:Choice>
-          <mc:Fallback xmlns="">
+          <mc:Fallback>
             <p:sp>
               <p:nvSpPr>
                 <p:cNvPr id="5" name="Rechteck 4">
@@ -30259,7 +30555,7 @@
                 <a:blipFill>
                   <a:blip r:embed="rId9"/>
                   <a:stretch>
-                    <a:fillRect l="-19388" t="-18182" r="-6122" b="-31818"/>
+                    <a:fillRect/>
                   </a:stretch>
                 </a:blipFill>
                 <a:ln w="9525" cap="flat" cmpd="sng" algn="ctr">
@@ -30287,8 +30583,8 @@
             </p:sp>
           </mc:Fallback>
         </mc:AlternateContent>
-        <mc:AlternateContent xmlns:mc="http://schemas.openxmlformats.org/markup-compatibility/2006" xmlns:a14="http://schemas.microsoft.com/office/drawing/2010/main">
-          <mc:Choice Requires="a14">
+        <mc:AlternateContent xmlns:mc="http://schemas.openxmlformats.org/markup-compatibility/2006">
+          <mc:Choice xmlns:a14="http://schemas.microsoft.com/office/drawing/2010/main" Requires="a14">
             <p:sp>
               <p:nvSpPr>
                 <p:cNvPr id="6" name="Rechteck 5">
@@ -30348,34 +30644,18 @@
                         <m:sSup>
                           <m:sSupPr>
                             <m:ctrlPr>
-                              <a:rPr lang="de-DE" i="1">
+                              <a:rPr lang="de-DE" i="1" smtClean="0">
                                 <a:latin typeface="Cambria Math" panose="02040503050406030204" pitchFamily="18" charset="0"/>
                               </a:rPr>
                             </m:ctrlPr>
                           </m:sSupPr>
                           <m:e>
-                            <m:groupChr>
-                              <m:groupChrPr>
-                                <m:chr m:val="→"/>
-                                <m:pos m:val="top"/>
-                                <m:ctrlPr>
-                                  <a:rPr lang="de-DE" i="1">
-                                    <a:latin typeface="Cambria Math" panose="02040503050406030204" pitchFamily="18" charset="0"/>
-                                  </a:rPr>
-                                </m:ctrlPr>
-                              </m:groupChrPr>
-                              <m:e>
-                                <m:r>
-                                  <m:rPr>
-                                    <m:brk m:alnAt="1"/>
-                                  </m:rPr>
-                                  <a:rPr lang="de-DE" i="1">
-                                    <a:latin typeface="Cambria Math" panose="02040503050406030204" pitchFamily="18" charset="0"/>
-                                  </a:rPr>
-                                  <m:t>𝐴</m:t>
-                                </m:r>
-                              </m:e>
-                            </m:groupChr>
+                            <m:r>
+                              <a:rPr lang="de-DE" b="0" i="1" smtClean="0">
+                                <a:latin typeface="Cambria Math" panose="02040503050406030204" pitchFamily="18" charset="0"/>
+                              </a:rPr>
+                              <m:t>𝐴</m:t>
+                            </m:r>
                           </m:e>
                           <m:sup>
                             <m:r>
@@ -30394,7 +30674,7 @@
               </p:txBody>
             </p:sp>
           </mc:Choice>
-          <mc:Fallback xmlns="">
+          <mc:Fallback>
             <p:sp>
               <p:nvSpPr>
                 <p:cNvPr id="6" name="Rechteck 5">
@@ -30420,7 +30700,7 @@
                 <a:blipFill>
                   <a:blip r:embed="rId10"/>
                   <a:stretch>
-                    <a:fillRect l="-19388" t="-18462" r="-6122" b="-33846"/>
+                    <a:fillRect/>
                   </a:stretch>
                 </a:blipFill>
                 <a:ln w="9525" cap="flat" cmpd="sng" algn="ctr">
@@ -30448,8 +30728,8 @@
             </p:sp>
           </mc:Fallback>
         </mc:AlternateContent>
-        <mc:AlternateContent xmlns:mc="http://schemas.openxmlformats.org/markup-compatibility/2006" xmlns:a14="http://schemas.microsoft.com/office/drawing/2010/main">
-          <mc:Choice Requires="a14">
+        <mc:AlternateContent xmlns:mc="http://schemas.openxmlformats.org/markup-compatibility/2006">
+          <mc:Choice xmlns:a14="http://schemas.microsoft.com/office/drawing/2010/main" Requires="a14">
             <p:sp>
               <p:nvSpPr>
                 <p:cNvPr id="7" name="Rechteck 6">
@@ -30509,34 +30789,18 @@
                         <m:sSup>
                           <m:sSupPr>
                             <m:ctrlPr>
-                              <a:rPr lang="de-DE" i="1">
+                              <a:rPr lang="de-DE" i="1" smtClean="0">
                                 <a:latin typeface="Cambria Math" panose="02040503050406030204" pitchFamily="18" charset="0"/>
                               </a:rPr>
                             </m:ctrlPr>
                           </m:sSupPr>
                           <m:e>
-                            <m:groupChr>
-                              <m:groupChrPr>
-                                <m:chr m:val="→"/>
-                                <m:pos m:val="top"/>
-                                <m:ctrlPr>
-                                  <a:rPr lang="de-DE" i="1">
-                                    <a:latin typeface="Cambria Math" panose="02040503050406030204" pitchFamily="18" charset="0"/>
-                                  </a:rPr>
-                                </m:ctrlPr>
-                              </m:groupChrPr>
-                              <m:e>
-                                <m:r>
-                                  <m:rPr>
-                                    <m:brk m:alnAt="1"/>
-                                  </m:rPr>
-                                  <a:rPr lang="de-DE" i="1">
-                                    <a:latin typeface="Cambria Math" panose="02040503050406030204" pitchFamily="18" charset="0"/>
-                                  </a:rPr>
-                                  <m:t>𝐴</m:t>
-                                </m:r>
-                              </m:e>
-                            </m:groupChr>
+                            <m:r>
+                              <a:rPr lang="de-DE" b="0" i="1" smtClean="0">
+                                <a:latin typeface="Cambria Math" panose="02040503050406030204" pitchFamily="18" charset="0"/>
+                              </a:rPr>
+                              <m:t>𝐴</m:t>
+                            </m:r>
                           </m:e>
                           <m:sup>
                             <m:r>
@@ -30555,7 +30819,7 @@
               </p:txBody>
             </p:sp>
           </mc:Choice>
-          <mc:Fallback xmlns="">
+          <mc:Fallback>
             <p:sp>
               <p:nvSpPr>
                 <p:cNvPr id="7" name="Rechteck 6">
@@ -30581,7 +30845,7 @@
                 <a:blipFill>
                   <a:blip r:embed="rId11"/>
                   <a:stretch>
-                    <a:fillRect l="-19388" t="-18462" r="-6122" b="-33846"/>
+                    <a:fillRect/>
                   </a:stretch>
                 </a:blipFill>
                 <a:ln w="9525" cap="flat" cmpd="sng" algn="ctr">
@@ -30609,8 +30873,8 @@
             </p:sp>
           </mc:Fallback>
         </mc:AlternateContent>
-        <mc:AlternateContent xmlns:mc="http://schemas.openxmlformats.org/markup-compatibility/2006" xmlns:a14="http://schemas.microsoft.com/office/drawing/2010/main">
-          <mc:Choice Requires="a14">
+        <mc:AlternateContent xmlns:mc="http://schemas.openxmlformats.org/markup-compatibility/2006">
+          <mc:Choice xmlns:a14="http://schemas.microsoft.com/office/drawing/2010/main" Requires="a14">
             <p:sp>
               <p:nvSpPr>
                 <p:cNvPr id="8" name="Rechteck 7">
@@ -30670,34 +30934,18 @@
                         <m:sSup>
                           <m:sSupPr>
                             <m:ctrlPr>
-                              <a:rPr lang="de-DE" i="1">
+                              <a:rPr lang="de-DE" i="1" smtClean="0">
                                 <a:latin typeface="Cambria Math" panose="02040503050406030204" pitchFamily="18" charset="0"/>
                               </a:rPr>
                             </m:ctrlPr>
                           </m:sSupPr>
                           <m:e>
-                            <m:groupChr>
-                              <m:groupChrPr>
-                                <m:chr m:val="→"/>
-                                <m:pos m:val="top"/>
-                                <m:ctrlPr>
-                                  <a:rPr lang="de-DE" i="1">
-                                    <a:latin typeface="Cambria Math" panose="02040503050406030204" pitchFamily="18" charset="0"/>
-                                  </a:rPr>
-                                </m:ctrlPr>
-                              </m:groupChrPr>
-                              <m:e>
-                                <m:r>
-                                  <m:rPr>
-                                    <m:brk m:alnAt="1"/>
-                                  </m:rPr>
-                                  <a:rPr lang="de-DE" i="1">
-                                    <a:latin typeface="Cambria Math" panose="02040503050406030204" pitchFamily="18" charset="0"/>
-                                  </a:rPr>
-                                  <m:t>𝐴</m:t>
-                                </m:r>
-                              </m:e>
-                            </m:groupChr>
+                            <m:r>
+                              <a:rPr lang="de-DE" b="0" i="1" smtClean="0">
+                                <a:latin typeface="Cambria Math" panose="02040503050406030204" pitchFamily="18" charset="0"/>
+                              </a:rPr>
+                              <m:t>𝐴</m:t>
+                            </m:r>
                           </m:e>
                           <m:sup>
                             <m:r>
@@ -30716,7 +30964,7 @@
               </p:txBody>
             </p:sp>
           </mc:Choice>
-          <mc:Fallback xmlns="">
+          <mc:Fallback>
             <p:sp>
               <p:nvSpPr>
                 <p:cNvPr id="8" name="Rechteck 7">
@@ -30742,7 +30990,7 @@
                 <a:blipFill>
                   <a:blip r:embed="rId12"/>
                   <a:stretch>
-                    <a:fillRect l="-19388" t="-18462" r="-6122" b="-33846"/>
+                    <a:fillRect/>
                   </a:stretch>
                 </a:blipFill>
                 <a:ln w="9525" cap="flat" cmpd="sng" algn="ctr">
@@ -30770,8 +31018,8 @@
             </p:sp>
           </mc:Fallback>
         </mc:AlternateContent>
-        <mc:AlternateContent xmlns:mc="http://schemas.openxmlformats.org/markup-compatibility/2006" xmlns:a14="http://schemas.microsoft.com/office/drawing/2010/main">
-          <mc:Choice Requires="a14">
+        <mc:AlternateContent xmlns:mc="http://schemas.openxmlformats.org/markup-compatibility/2006">
+          <mc:Choice xmlns:a14="http://schemas.microsoft.com/office/drawing/2010/main" Requires="a14">
             <p:sp>
               <p:nvSpPr>
                 <p:cNvPr id="9" name="Rechteck 8">
@@ -30831,34 +31079,18 @@
                         <m:sSup>
                           <m:sSupPr>
                             <m:ctrlPr>
-                              <a:rPr lang="de-DE" i="1">
+                              <a:rPr lang="de-DE" i="1" smtClean="0">
                                 <a:latin typeface="Cambria Math" panose="02040503050406030204" pitchFamily="18" charset="0"/>
                               </a:rPr>
                             </m:ctrlPr>
                           </m:sSupPr>
                           <m:e>
-                            <m:groupChr>
-                              <m:groupChrPr>
-                                <m:chr m:val="→"/>
-                                <m:pos m:val="top"/>
-                                <m:ctrlPr>
-                                  <a:rPr lang="de-DE" i="1">
-                                    <a:latin typeface="Cambria Math" panose="02040503050406030204" pitchFamily="18" charset="0"/>
-                                  </a:rPr>
-                                </m:ctrlPr>
-                              </m:groupChrPr>
-                              <m:e>
-                                <m:r>
-                                  <m:rPr>
-                                    <m:brk m:alnAt="1"/>
-                                  </m:rPr>
-                                  <a:rPr lang="de-DE" i="1">
-                                    <a:latin typeface="Cambria Math" panose="02040503050406030204" pitchFamily="18" charset="0"/>
-                                  </a:rPr>
-                                  <m:t>𝐴</m:t>
-                                </m:r>
-                              </m:e>
-                            </m:groupChr>
+                            <m:r>
+                              <a:rPr lang="de-DE" b="0" i="1" smtClean="0">
+                                <a:latin typeface="Cambria Math" panose="02040503050406030204" pitchFamily="18" charset="0"/>
+                              </a:rPr>
+                              <m:t>𝐴</m:t>
+                            </m:r>
                           </m:e>
                           <m:sup>
                             <m:r>
@@ -30877,7 +31109,7 @@
               </p:txBody>
             </p:sp>
           </mc:Choice>
-          <mc:Fallback xmlns="">
+          <mc:Fallback>
             <p:sp>
               <p:nvSpPr>
                 <p:cNvPr id="9" name="Rechteck 8">
@@ -30903,7 +31135,7 @@
                 <a:blipFill>
                   <a:blip r:embed="rId13"/>
                   <a:stretch>
-                    <a:fillRect l="-20408" t="-18462" r="-5102" b="-33846"/>
+                    <a:fillRect l="-1020"/>
                   </a:stretch>
                 </a:blipFill>
                 <a:ln w="9525" cap="flat" cmpd="sng" algn="ctr">
@@ -30931,8 +31163,8 @@
             </p:sp>
           </mc:Fallback>
         </mc:AlternateContent>
-        <mc:AlternateContent xmlns:mc="http://schemas.openxmlformats.org/markup-compatibility/2006" xmlns:a14="http://schemas.microsoft.com/office/drawing/2010/main">
-          <mc:Choice Requires="a14">
+        <mc:AlternateContent xmlns:mc="http://schemas.openxmlformats.org/markup-compatibility/2006">
+          <mc:Choice xmlns:a14="http://schemas.microsoft.com/office/drawing/2010/main" Requires="a14">
             <p:sp>
               <p:nvSpPr>
                 <p:cNvPr id="10" name="Flussdiagramm: Verbinder 9">
@@ -31002,7 +31234,7 @@
                               <a:rPr lang="de-DE" sz="1000" b="0" i="1" smtClean="0">
                                 <a:latin typeface="Cambria Math" panose="02040503050406030204" pitchFamily="18" charset="0"/>
                               </a:rPr>
-                              <m:t>𝐴</m:t>
+                              <m:t>𝑥</m:t>
                             </m:r>
                           </m:e>
                           <m:sup>
@@ -31022,7 +31254,7 @@
               </p:txBody>
             </p:sp>
           </mc:Choice>
-          <mc:Fallback xmlns="">
+          <mc:Fallback>
             <p:sp>
               <p:nvSpPr>
                 <p:cNvPr id="10" name="Flussdiagramm: Verbinder 9">
@@ -31076,8 +31308,8 @@
             </p:sp>
           </mc:Fallback>
         </mc:AlternateContent>
-        <mc:AlternateContent xmlns:mc="http://schemas.openxmlformats.org/markup-compatibility/2006" xmlns:a14="http://schemas.microsoft.com/office/drawing/2010/main">
-          <mc:Choice Requires="a14">
+        <mc:AlternateContent xmlns:mc="http://schemas.openxmlformats.org/markup-compatibility/2006">
+          <mc:Choice xmlns:a14="http://schemas.microsoft.com/office/drawing/2010/main" Requires="a14">
             <p:sp>
               <p:nvSpPr>
                 <p:cNvPr id="12" name="Flussdiagramm: Verbinder 11">
@@ -31144,10 +31376,10 @@
                           </m:sSupPr>
                           <m:e>
                             <m:r>
-                              <a:rPr lang="de-DE" sz="1000" i="1">
+                              <a:rPr lang="de-DE" sz="1000" b="0" i="1" smtClean="0">
                                 <a:latin typeface="Cambria Math" panose="02040503050406030204" pitchFamily="18" charset="0"/>
                               </a:rPr>
-                              <m:t>𝐴</m:t>
+                              <m:t>𝑥</m:t>
                             </m:r>
                           </m:e>
                           <m:sup>
@@ -31181,7 +31413,7 @@
               </p:txBody>
             </p:sp>
           </mc:Choice>
-          <mc:Fallback xmlns="">
+          <mc:Fallback>
             <p:sp>
               <p:nvSpPr>
                 <p:cNvPr id="12" name="Flussdiagramm: Verbinder 11">
@@ -31235,8 +31467,8 @@
             </p:sp>
           </mc:Fallback>
         </mc:AlternateContent>
-        <mc:AlternateContent xmlns:mc="http://schemas.openxmlformats.org/markup-compatibility/2006" xmlns:a14="http://schemas.microsoft.com/office/drawing/2010/main">
-          <mc:Choice Requires="a14">
+        <mc:AlternateContent xmlns:mc="http://schemas.openxmlformats.org/markup-compatibility/2006">
+          <mc:Choice xmlns:a14="http://schemas.microsoft.com/office/drawing/2010/main" Requires="a14">
             <p:sp>
               <p:nvSpPr>
                 <p:cNvPr id="13" name="Flussdiagramm: Verbinder 12">
@@ -31303,10 +31535,10 @@
                           </m:sSupPr>
                           <m:e>
                             <m:r>
-                              <a:rPr lang="de-DE" sz="1000" i="1">
+                              <a:rPr lang="de-DE" sz="1000" b="0" i="1" smtClean="0">
                                 <a:latin typeface="Cambria Math" panose="02040503050406030204" pitchFamily="18" charset="0"/>
                               </a:rPr>
-                              <m:t>𝐴</m:t>
+                              <m:t>𝑥</m:t>
                             </m:r>
                           </m:e>
                           <m:sup>
@@ -31340,7 +31572,7 @@
               </p:txBody>
             </p:sp>
           </mc:Choice>
-          <mc:Fallback xmlns="">
+          <mc:Fallback>
             <p:sp>
               <p:nvSpPr>
                 <p:cNvPr id="13" name="Flussdiagramm: Verbinder 12">
@@ -31394,8 +31626,8 @@
             </p:sp>
           </mc:Fallback>
         </mc:AlternateContent>
-        <mc:AlternateContent xmlns:mc="http://schemas.openxmlformats.org/markup-compatibility/2006" xmlns:a14="http://schemas.microsoft.com/office/drawing/2010/main">
-          <mc:Choice Requires="a14">
+        <mc:AlternateContent xmlns:mc="http://schemas.openxmlformats.org/markup-compatibility/2006">
+          <mc:Choice xmlns:a14="http://schemas.microsoft.com/office/drawing/2010/main" Requires="a14">
             <p:sp>
               <p:nvSpPr>
                 <p:cNvPr id="14" name="Flussdiagramm: Verbinder 13">
@@ -31455,17 +31687,23 @@
                         <m:sSup>
                           <m:sSupPr>
                             <m:ctrlPr>
-                              <a:rPr lang="de-DE" sz="1000" i="1">
+                              <a:rPr lang="de-DE" sz="1000" i="1" smtClean="0">
                                 <a:latin typeface="Cambria Math" panose="02040503050406030204" pitchFamily="18" charset="0"/>
                               </a:rPr>
                             </m:ctrlPr>
                           </m:sSupPr>
                           <m:e>
                             <m:r>
-                              <a:rPr lang="de-DE" sz="1000" i="1">
+                              <a:rPr lang="de-DE" sz="1000" b="0" i="1" smtClean="0">
                                 <a:latin typeface="Cambria Math" panose="02040503050406030204" pitchFamily="18" charset="0"/>
                               </a:rPr>
-                              <m:t>𝐴</m:t>
+                              <m:t>   </m:t>
+                            </m:r>
+                            <m:r>
+                              <a:rPr lang="de-DE" sz="1000" b="0" i="1" smtClean="0">
+                                <a:latin typeface="Cambria Math" panose="02040503050406030204" pitchFamily="18" charset="0"/>
+                              </a:rPr>
+                              <m:t>𝑥</m:t>
                             </m:r>
                           </m:e>
                           <m:sup>
@@ -31499,7 +31737,7 @@
               </p:txBody>
             </p:sp>
           </mc:Choice>
-          <mc:Fallback xmlns="">
+          <mc:Fallback>
             <p:sp>
               <p:nvSpPr>
                 <p:cNvPr id="14" name="Flussdiagramm: Verbinder 13">
@@ -31525,7 +31763,7 @@
                 <a:blipFill>
                   <a:blip r:embed="rId17"/>
                   <a:stretch>
-                    <a:fillRect l="-13115" r="-3279"/>
+                    <a:fillRect l="-13115" r="-13115"/>
                   </a:stretch>
                 </a:blipFill>
                 <a:ln w="9525" cap="flat" cmpd="sng" algn="ctr">
@@ -31553,8 +31791,8 @@
             </p:sp>
           </mc:Fallback>
         </mc:AlternateContent>
-        <mc:AlternateContent xmlns:mc="http://schemas.openxmlformats.org/markup-compatibility/2006" xmlns:a14="http://schemas.microsoft.com/office/drawing/2010/main">
-          <mc:Choice Requires="a14">
+        <mc:AlternateContent xmlns:mc="http://schemas.openxmlformats.org/markup-compatibility/2006">
+          <mc:Choice xmlns:a14="http://schemas.microsoft.com/office/drawing/2010/main" Requires="a14">
             <p:sp>
               <p:nvSpPr>
                 <p:cNvPr id="15" name="Flussdiagramm: Verbinder 14">
@@ -31614,17 +31852,17 @@
                         <m:sSup>
                           <m:sSupPr>
                             <m:ctrlPr>
-                              <a:rPr lang="de-DE" sz="1000" i="1">
+                              <a:rPr lang="de-DE" sz="1000" i="1" smtClean="0">
                                 <a:latin typeface="Cambria Math" panose="02040503050406030204" pitchFamily="18" charset="0"/>
                               </a:rPr>
                             </m:ctrlPr>
                           </m:sSupPr>
                           <m:e>
                             <m:r>
-                              <a:rPr lang="de-DE" sz="1000" i="1">
+                              <a:rPr lang="de-DE" sz="1000" b="0" i="1" smtClean="0">
                                 <a:latin typeface="Cambria Math" panose="02040503050406030204" pitchFamily="18" charset="0"/>
                               </a:rPr>
-                              <m:t>𝐴</m:t>
+                              <m:t>𝑥</m:t>
                             </m:r>
                           </m:e>
                           <m:sup>
@@ -31658,7 +31896,7 @@
               </p:txBody>
             </p:sp>
           </mc:Choice>
-          <mc:Fallback xmlns="">
+          <mc:Fallback>
             <p:sp>
               <p:nvSpPr>
                 <p:cNvPr id="15" name="Flussdiagramm: Verbinder 14">
@@ -31960,8 +32198,8 @@
             </a:fontRef>
           </p:style>
         </p:cxnSp>
-        <mc:AlternateContent xmlns:mc="http://schemas.openxmlformats.org/markup-compatibility/2006" xmlns:a14="http://schemas.microsoft.com/office/drawing/2010/main">
-          <mc:Choice Requires="a14">
+        <mc:AlternateContent xmlns:mc="http://schemas.openxmlformats.org/markup-compatibility/2006">
+          <mc:Choice xmlns:a14="http://schemas.microsoft.com/office/drawing/2010/main" Requires="a14">
             <p:sp>
               <p:nvSpPr>
                 <p:cNvPr id="34" name="Rechteck 33">
@@ -32027,28 +32265,12 @@
                             </m:ctrlPr>
                           </m:sSupPr>
                           <m:e>
-                            <m:groupChr>
-                              <m:groupChrPr>
-                                <m:chr m:val="→"/>
-                                <m:pos m:val="top"/>
-                                <m:ctrlPr>
-                                  <a:rPr lang="de-DE" i="1">
-                                    <a:latin typeface="Cambria Math" panose="02040503050406030204" pitchFamily="18" charset="0"/>
-                                  </a:rPr>
-                                </m:ctrlPr>
-                              </m:groupChrPr>
-                              <m:e>
-                                <m:r>
-                                  <m:rPr>
-                                    <m:brk m:alnAt="1"/>
-                                  </m:rPr>
-                                  <a:rPr lang="de-DE" i="1">
-                                    <a:latin typeface="Cambria Math" panose="02040503050406030204" pitchFamily="18" charset="0"/>
-                                  </a:rPr>
-                                  <m:t>𝐴</m:t>
-                                </m:r>
-                              </m:e>
-                            </m:groupChr>
+                            <m:r>
+                              <a:rPr lang="de-DE" b="0" i="1" smtClean="0">
+                                <a:latin typeface="Cambria Math" panose="02040503050406030204" pitchFamily="18" charset="0"/>
+                              </a:rPr>
+                              <m:t>𝐴</m:t>
+                            </m:r>
                           </m:e>
                           <m:sup>
                             <m:r>
@@ -32079,7 +32301,7 @@
               </p:txBody>
             </p:sp>
           </mc:Choice>
-          <mc:Fallback xmlns="">
+          <mc:Fallback>
             <p:sp>
               <p:nvSpPr>
                 <p:cNvPr id="34" name="Rechteck 33">
@@ -32105,7 +32327,7 @@
                 <a:blipFill>
                   <a:blip r:embed="rId19"/>
                   <a:stretch>
-                    <a:fillRect l="-20619" t="-18462" r="-6186" b="-33846"/>
+                    <a:fillRect l="-1031"/>
                   </a:stretch>
                 </a:blipFill>
                 <a:ln w="9525" cap="flat" cmpd="sng" algn="ctr">
@@ -32133,8 +32355,8 @@
             </p:sp>
           </mc:Fallback>
         </mc:AlternateContent>
-        <mc:AlternateContent xmlns:mc="http://schemas.openxmlformats.org/markup-compatibility/2006" xmlns:a14="http://schemas.microsoft.com/office/drawing/2010/main">
-          <mc:Choice Requires="a14">
+        <mc:AlternateContent xmlns:mc="http://schemas.openxmlformats.org/markup-compatibility/2006">
+          <mc:Choice xmlns:a14="http://schemas.microsoft.com/office/drawing/2010/main" Requires="a14">
             <p:sp>
               <p:nvSpPr>
                 <p:cNvPr id="35" name="Rechteck 34">
@@ -32194,34 +32416,18 @@
                         <m:sSup>
                           <m:sSupPr>
                             <m:ctrlPr>
-                              <a:rPr lang="de-DE" i="1">
+                              <a:rPr lang="de-DE" i="1" smtClean="0">
                                 <a:latin typeface="Cambria Math" panose="02040503050406030204" pitchFamily="18" charset="0"/>
                               </a:rPr>
                             </m:ctrlPr>
                           </m:sSupPr>
                           <m:e>
-                            <m:groupChr>
-                              <m:groupChrPr>
-                                <m:chr m:val="→"/>
-                                <m:pos m:val="top"/>
-                                <m:ctrlPr>
-                                  <a:rPr lang="de-DE" i="1">
-                                    <a:latin typeface="Cambria Math" panose="02040503050406030204" pitchFamily="18" charset="0"/>
-                                  </a:rPr>
-                                </m:ctrlPr>
-                              </m:groupChrPr>
-                              <m:e>
-                                <m:r>
-                                  <m:rPr>
-                                    <m:brk m:alnAt="1"/>
-                                  </m:rPr>
-                                  <a:rPr lang="de-DE" i="1">
-                                    <a:latin typeface="Cambria Math" panose="02040503050406030204" pitchFamily="18" charset="0"/>
-                                  </a:rPr>
-                                  <m:t>𝐴</m:t>
-                                </m:r>
-                              </m:e>
-                            </m:groupChr>
+                            <m:r>
+                              <a:rPr lang="de-DE" b="0" i="1" smtClean="0">
+                                <a:latin typeface="Cambria Math" panose="02040503050406030204" pitchFamily="18" charset="0"/>
+                              </a:rPr>
+                              <m:t>𝐴</m:t>
+                            </m:r>
                           </m:e>
                           <m:sup>
                             <m:r>
@@ -32240,7 +32446,7 @@
               </p:txBody>
             </p:sp>
           </mc:Choice>
-          <mc:Fallback xmlns="">
+          <mc:Fallback>
             <p:sp>
               <p:nvSpPr>
                 <p:cNvPr id="35" name="Rechteck 34">
@@ -32266,7 +32472,7 @@
                 <a:blipFill>
                   <a:blip r:embed="rId20"/>
                   <a:stretch>
-                    <a:fillRect l="-20619" t="-18182" r="-6186" b="-31818"/>
+                    <a:fillRect l="-1031"/>
                   </a:stretch>
                 </a:blipFill>
                 <a:ln w="9525" cap="flat" cmpd="sng" algn="ctr">
@@ -32294,8 +32500,8 @@
             </p:sp>
           </mc:Fallback>
         </mc:AlternateContent>
-        <mc:AlternateContent xmlns:mc="http://schemas.openxmlformats.org/markup-compatibility/2006" xmlns:a14="http://schemas.microsoft.com/office/drawing/2010/main">
-          <mc:Choice Requires="a14">
+        <mc:AlternateContent xmlns:mc="http://schemas.openxmlformats.org/markup-compatibility/2006">
+          <mc:Choice xmlns:a14="http://schemas.microsoft.com/office/drawing/2010/main" Requires="a14">
             <p:sp>
               <p:nvSpPr>
                 <p:cNvPr id="37" name="Rechteck 36">
@@ -32355,34 +32561,18 @@
                         <m:sSup>
                           <m:sSupPr>
                             <m:ctrlPr>
-                              <a:rPr lang="de-DE" i="1">
+                              <a:rPr lang="de-DE" i="1" smtClean="0">
                                 <a:latin typeface="Cambria Math" panose="02040503050406030204" pitchFamily="18" charset="0"/>
                               </a:rPr>
                             </m:ctrlPr>
                           </m:sSupPr>
                           <m:e>
-                            <m:groupChr>
-                              <m:groupChrPr>
-                                <m:chr m:val="→"/>
-                                <m:pos m:val="top"/>
-                                <m:ctrlPr>
-                                  <a:rPr lang="de-DE" i="1">
-                                    <a:latin typeface="Cambria Math" panose="02040503050406030204" pitchFamily="18" charset="0"/>
-                                  </a:rPr>
-                                </m:ctrlPr>
-                              </m:groupChrPr>
-                              <m:e>
-                                <m:r>
-                                  <m:rPr>
-                                    <m:brk m:alnAt="1"/>
-                                  </m:rPr>
-                                  <a:rPr lang="de-DE" i="1">
-                                    <a:latin typeface="Cambria Math" panose="02040503050406030204" pitchFamily="18" charset="0"/>
-                                  </a:rPr>
-                                  <m:t>𝐴</m:t>
-                                </m:r>
-                              </m:e>
-                            </m:groupChr>
+                            <m:r>
+                              <a:rPr lang="de-DE" b="0" i="1" smtClean="0">
+                                <a:latin typeface="Cambria Math" panose="02040503050406030204" pitchFamily="18" charset="0"/>
+                              </a:rPr>
+                              <m:t>𝐴</m:t>
+                            </m:r>
                           </m:e>
                           <m:sup>
                             <m:r>
@@ -32401,7 +32591,7 @@
               </p:txBody>
             </p:sp>
           </mc:Choice>
-          <mc:Fallback xmlns="">
+          <mc:Fallback>
             <p:sp>
               <p:nvSpPr>
                 <p:cNvPr id="37" name="Rechteck 36">
@@ -32427,7 +32617,7 @@
                 <a:blipFill>
                   <a:blip r:embed="rId21"/>
                   <a:stretch>
-                    <a:fillRect l="-20619" t="-18462" r="-6186" b="-33846"/>
+                    <a:fillRect l="-1031"/>
                   </a:stretch>
                 </a:blipFill>
                 <a:ln w="9525" cap="flat" cmpd="sng" algn="ctr">
@@ -32455,8 +32645,8 @@
             </p:sp>
           </mc:Fallback>
         </mc:AlternateContent>
-        <mc:AlternateContent xmlns:mc="http://schemas.openxmlformats.org/markup-compatibility/2006" xmlns:a14="http://schemas.microsoft.com/office/drawing/2010/main">
-          <mc:Choice Requires="a14">
+        <mc:AlternateContent xmlns:mc="http://schemas.openxmlformats.org/markup-compatibility/2006">
+          <mc:Choice xmlns:a14="http://schemas.microsoft.com/office/drawing/2010/main" Requires="a14">
             <p:sp>
               <p:nvSpPr>
                 <p:cNvPr id="39" name="Rechteck 38">
@@ -32516,34 +32706,18 @@
                         <m:sSup>
                           <m:sSupPr>
                             <m:ctrlPr>
-                              <a:rPr lang="de-DE" i="1">
+                              <a:rPr lang="de-DE" i="1" smtClean="0">
                                 <a:latin typeface="Cambria Math" panose="02040503050406030204" pitchFamily="18" charset="0"/>
                               </a:rPr>
                             </m:ctrlPr>
                           </m:sSupPr>
                           <m:e>
-                            <m:groupChr>
-                              <m:groupChrPr>
-                                <m:chr m:val="→"/>
-                                <m:pos m:val="top"/>
-                                <m:ctrlPr>
-                                  <a:rPr lang="de-DE" i="1">
-                                    <a:latin typeface="Cambria Math" panose="02040503050406030204" pitchFamily="18" charset="0"/>
-                                  </a:rPr>
-                                </m:ctrlPr>
-                              </m:groupChrPr>
-                              <m:e>
-                                <m:r>
-                                  <m:rPr>
-                                    <m:brk m:alnAt="1"/>
-                                  </m:rPr>
-                                  <a:rPr lang="de-DE" i="1">
-                                    <a:latin typeface="Cambria Math" panose="02040503050406030204" pitchFamily="18" charset="0"/>
-                                  </a:rPr>
-                                  <m:t>𝐴</m:t>
-                                </m:r>
-                              </m:e>
-                            </m:groupChr>
+                            <m:r>
+                              <a:rPr lang="de-DE" b="0" i="1" smtClean="0">
+                                <a:latin typeface="Cambria Math" panose="02040503050406030204" pitchFamily="18" charset="0"/>
+                              </a:rPr>
+                              <m:t>𝐴</m:t>
+                            </m:r>
                           </m:e>
                           <m:sup>
                             <m:r>
@@ -32562,7 +32736,7 @@
               </p:txBody>
             </p:sp>
           </mc:Choice>
-          <mc:Fallback xmlns="">
+          <mc:Fallback>
             <p:sp>
               <p:nvSpPr>
                 <p:cNvPr id="39" name="Rechteck 38">
@@ -32588,7 +32762,7 @@
                 <a:blipFill>
                   <a:blip r:embed="rId22"/>
                   <a:stretch>
-                    <a:fillRect l="-20619" t="-18462" r="-6186" b="-33846"/>
+                    <a:fillRect l="-1031"/>
                   </a:stretch>
                 </a:blipFill>
                 <a:ln w="9525" cap="flat" cmpd="sng" algn="ctr">
@@ -32616,8 +32790,8 @@
             </p:sp>
           </mc:Fallback>
         </mc:AlternateContent>
-        <mc:AlternateContent xmlns:mc="http://schemas.openxmlformats.org/markup-compatibility/2006" xmlns:a14="http://schemas.microsoft.com/office/drawing/2010/main">
-          <mc:Choice Requires="a14">
+        <mc:AlternateContent xmlns:mc="http://schemas.openxmlformats.org/markup-compatibility/2006">
+          <mc:Choice xmlns:a14="http://schemas.microsoft.com/office/drawing/2010/main" Requires="a14">
             <p:sp>
               <p:nvSpPr>
                 <p:cNvPr id="47" name="Rechteck 46">
@@ -32677,34 +32851,18 @@
                         <m:sSup>
                           <m:sSupPr>
                             <m:ctrlPr>
-                              <a:rPr lang="de-DE" i="1">
+                              <a:rPr lang="de-DE" i="1" smtClean="0">
                                 <a:latin typeface="Cambria Math" panose="02040503050406030204" pitchFamily="18" charset="0"/>
                               </a:rPr>
                             </m:ctrlPr>
                           </m:sSupPr>
                           <m:e>
-                            <m:groupChr>
-                              <m:groupChrPr>
-                                <m:chr m:val="→"/>
-                                <m:pos m:val="top"/>
-                                <m:ctrlPr>
-                                  <a:rPr lang="de-DE" i="1">
-                                    <a:latin typeface="Cambria Math" panose="02040503050406030204" pitchFamily="18" charset="0"/>
-                                  </a:rPr>
-                                </m:ctrlPr>
-                              </m:groupChrPr>
-                              <m:e>
-                                <m:r>
-                                  <m:rPr>
-                                    <m:brk m:alnAt="1"/>
-                                  </m:rPr>
-                                  <a:rPr lang="de-DE" i="1">
-                                    <a:latin typeface="Cambria Math" panose="02040503050406030204" pitchFamily="18" charset="0"/>
-                                  </a:rPr>
-                                  <m:t>𝐴</m:t>
-                                </m:r>
-                              </m:e>
-                            </m:groupChr>
+                            <m:r>
+                              <a:rPr lang="de-DE" b="0" i="1" smtClean="0">
+                                <a:latin typeface="Cambria Math" panose="02040503050406030204" pitchFamily="18" charset="0"/>
+                              </a:rPr>
+                              <m:t>𝐴</m:t>
+                            </m:r>
                           </m:e>
                           <m:sup>
                             <m:r>
@@ -32723,7 +32881,7 @@
               </p:txBody>
             </p:sp>
           </mc:Choice>
-          <mc:Fallback xmlns="">
+          <mc:Fallback>
             <p:sp>
               <p:nvSpPr>
                 <p:cNvPr id="47" name="Rechteck 46">
@@ -32749,7 +32907,7 @@
                 <a:blipFill>
                   <a:blip r:embed="rId23"/>
                   <a:stretch>
-                    <a:fillRect l="-20619" t="-18462" r="-6186" b="-33846"/>
+                    <a:fillRect l="-1031"/>
                   </a:stretch>
                 </a:blipFill>
                 <a:ln w="9525" cap="flat" cmpd="sng" algn="ctr">
@@ -32777,8 +32935,8 @@
             </p:sp>
           </mc:Fallback>
         </mc:AlternateContent>
-        <mc:AlternateContent xmlns:mc="http://schemas.openxmlformats.org/markup-compatibility/2006" xmlns:a14="http://schemas.microsoft.com/office/drawing/2010/main">
-          <mc:Choice Requires="a14">
+        <mc:AlternateContent xmlns:mc="http://schemas.openxmlformats.org/markup-compatibility/2006">
+          <mc:Choice xmlns:a14="http://schemas.microsoft.com/office/drawing/2010/main" Requires="a14">
             <p:sp>
               <p:nvSpPr>
                 <p:cNvPr id="48" name="Rechteck 47">
@@ -32838,34 +32996,18 @@
                         <m:sSup>
                           <m:sSupPr>
                             <m:ctrlPr>
-                              <a:rPr lang="de-DE" i="1">
+                              <a:rPr lang="de-DE" i="1" smtClean="0">
                                 <a:latin typeface="Cambria Math" panose="02040503050406030204" pitchFamily="18" charset="0"/>
                               </a:rPr>
                             </m:ctrlPr>
                           </m:sSupPr>
                           <m:e>
-                            <m:groupChr>
-                              <m:groupChrPr>
-                                <m:chr m:val="→"/>
-                                <m:pos m:val="top"/>
-                                <m:ctrlPr>
-                                  <a:rPr lang="de-DE" i="1">
-                                    <a:latin typeface="Cambria Math" panose="02040503050406030204" pitchFamily="18" charset="0"/>
-                                  </a:rPr>
-                                </m:ctrlPr>
-                              </m:groupChrPr>
-                              <m:e>
-                                <m:r>
-                                  <m:rPr>
-                                    <m:brk m:alnAt="1"/>
-                                  </m:rPr>
-                                  <a:rPr lang="de-DE" i="1">
-                                    <a:latin typeface="Cambria Math" panose="02040503050406030204" pitchFamily="18" charset="0"/>
-                                  </a:rPr>
-                                  <m:t>𝐴</m:t>
-                                </m:r>
-                              </m:e>
-                            </m:groupChr>
+                            <m:r>
+                              <a:rPr lang="de-DE" b="0" i="1" smtClean="0">
+                                <a:latin typeface="Cambria Math" panose="02040503050406030204" pitchFamily="18" charset="0"/>
+                              </a:rPr>
+                              <m:t>𝐴</m:t>
+                            </m:r>
                           </m:e>
                           <m:sup>
                             <m:r>
@@ -32884,7 +33026,7 @@
               </p:txBody>
             </p:sp>
           </mc:Choice>
-          <mc:Fallback xmlns="">
+          <mc:Fallback>
             <p:sp>
               <p:nvSpPr>
                 <p:cNvPr id="48" name="Rechteck 47">
@@ -32910,7 +33052,7 @@
                 <a:blipFill>
                   <a:blip r:embed="rId24"/>
                   <a:stretch>
-                    <a:fillRect l="-19388" t="-18462" r="-6122" b="-33846"/>
+                    <a:fillRect/>
                   </a:stretch>
                 </a:blipFill>
                 <a:ln w="9525" cap="flat" cmpd="sng" algn="ctr">
@@ -33640,8 +33782,8 @@
           </p:nvSpPr>
           <p:spPr>
             <a:xfrm>
-              <a:off x="7383328" y="4778693"/>
-              <a:ext cx="333179" cy="329103"/>
+              <a:off x="7383329" y="4811019"/>
+              <a:ext cx="272298" cy="252387"/>
             </a:xfrm>
             <a:prstGeom prst="flowChartConnector">
               <a:avLst/>
@@ -33697,9 +33839,9 @@
             <p:nvPr/>
           </p:nvCxnSpPr>
           <p:spPr>
-            <a:xfrm>
-              <a:off x="7059682" y="4938045"/>
-              <a:ext cx="323646" cy="5200"/>
+            <a:xfrm flipV="1">
+              <a:off x="7059682" y="4937213"/>
+              <a:ext cx="323647" cy="832"/>
             </a:xfrm>
             <a:prstGeom prst="straightConnector1">
               <a:avLst/>
@@ -34332,8 +34474,8 @@
           </p:nvCxnSpPr>
           <p:spPr>
             <a:xfrm flipV="1">
-              <a:off x="7549918" y="2174904"/>
-              <a:ext cx="413124" cy="2603789"/>
+              <a:off x="7519478" y="2174904"/>
+              <a:ext cx="443564" cy="2636115"/>
             </a:xfrm>
             <a:prstGeom prst="straightConnector1">
               <a:avLst/>
@@ -34375,8 +34517,8 @@
           </p:nvCxnSpPr>
           <p:spPr>
             <a:xfrm flipV="1">
-              <a:off x="7549918" y="2727532"/>
-              <a:ext cx="413124" cy="2051161"/>
+              <a:off x="7519478" y="2727532"/>
+              <a:ext cx="443564" cy="2083487"/>
             </a:xfrm>
             <a:prstGeom prst="straightConnector1">
               <a:avLst/>
@@ -34418,8 +34560,8 @@
           </p:nvCxnSpPr>
           <p:spPr>
             <a:xfrm flipV="1">
-              <a:off x="7549918" y="3280160"/>
-              <a:ext cx="412562" cy="1498533"/>
+              <a:off x="7519478" y="3280160"/>
+              <a:ext cx="443002" cy="1530859"/>
             </a:xfrm>
             <a:prstGeom prst="straightConnector1">
               <a:avLst/>
@@ -34460,9 +34602,9 @@
             <p:nvPr/>
           </p:nvCxnSpPr>
           <p:spPr>
-            <a:xfrm flipV="1">
-              <a:off x="7716507" y="4938044"/>
-              <a:ext cx="245973" cy="5201"/>
+            <a:xfrm>
+              <a:off x="7655627" y="4937213"/>
+              <a:ext cx="306853" cy="831"/>
             </a:xfrm>
             <a:prstGeom prst="straightConnector1">
               <a:avLst/>
@@ -36135,12 +36277,20 @@
             <a:p>
               <a:pPr algn="ctr"/>
               <a:r>
+                <a:rPr lang="de-DE" sz="1000" b="1" dirty="0" err="1">
+                  <a:solidFill>
+                    <a:schemeClr val="accent1"/>
+                  </a:solidFill>
+                </a:rPr>
+                <a:t>input</a:t>
+              </a:r>
+              <a:r>
                 <a:rPr lang="de-DE" sz="1000" b="1" dirty="0">
                   <a:solidFill>
                     <a:schemeClr val="accent1"/>
                   </a:solidFill>
                 </a:rPr>
-                <a:t>Input </a:t>
+                <a:t> </a:t>
               </a:r>
             </a:p>
             <a:p>
@@ -36150,7 +36300,7 @@
                     <a:schemeClr val="accent1"/>
                   </a:solidFill>
                 </a:rPr>
-                <a:t>Sequence</a:t>
+                <a:t>sequence</a:t>
               </a:r>
               <a:endParaRPr lang="de-DE" sz="1000" b="1" dirty="0">
                 <a:solidFill>
@@ -36219,7 +36369,7 @@
                     <a:schemeClr val="accent6"/>
                   </a:solidFill>
                 </a:rPr>
-                <a:t>Layers</a:t>
+                <a:t>layers</a:t>
               </a:r>
               <a:endParaRPr lang="de-DE" sz="1000" b="1" dirty="0">
                 <a:solidFill>
@@ -36264,7 +36414,7 @@
                     <a:schemeClr val="accent4"/>
                   </a:solidFill>
                 </a:rPr>
-                <a:t>Fully </a:t>
+                <a:t>fully </a:t>
               </a:r>
             </a:p>
             <a:p>
@@ -36283,8 +36433,21 @@
                     <a:schemeClr val="accent4"/>
                   </a:solidFill>
                 </a:rPr>
-                <a:t> Layer</a:t>
+                <a:t> </a:t>
               </a:r>
+              <a:r>
+                <a:rPr lang="de-DE" sz="1000" b="1" dirty="0" err="1">
+                  <a:solidFill>
+                    <a:schemeClr val="accent4"/>
+                  </a:solidFill>
+                </a:rPr>
+                <a:t>layer</a:t>
+              </a:r>
+              <a:endParaRPr lang="de-DE" sz="1000" b="1" dirty="0">
+                <a:solidFill>
+                  <a:schemeClr val="accent4"/>
+                </a:solidFill>
+              </a:endParaRPr>
             </a:p>
           </p:txBody>
         </p:sp>
@@ -36318,13 +36481,18 @@
             <a:p>
               <a:pPr algn="ctr"/>
               <a:r>
-                <a:rPr lang="de-DE" sz="1000" b="1" dirty="0">
+                <a:rPr lang="de-DE" sz="1000" b="1" dirty="0" err="1">
                   <a:solidFill>
                     <a:srgbClr val="C00000"/>
                   </a:solidFill>
                 </a:rPr>
-                <a:t>Output</a:t>
+                <a:t>output</a:t>
               </a:r>
+              <a:endParaRPr lang="de-DE" sz="1000" b="1" dirty="0">
+                <a:solidFill>
+                  <a:srgbClr val="C00000"/>
+                </a:solidFill>
+              </a:endParaRPr>
             </a:p>
           </p:txBody>
         </p:sp>
@@ -36387,7 +36555,7 @@
           </p:nvSpPr>
           <p:spPr>
             <a:xfrm>
-              <a:off x="7864338" y="5941213"/>
+              <a:off x="7977572" y="5965765"/>
               <a:ext cx="481222" cy="261610"/>
             </a:xfrm>
             <a:prstGeom prst="rect">
@@ -36489,8 +36657,8 @@
           </p:nvCxnSpPr>
           <p:spPr>
             <a:xfrm flipV="1">
-              <a:off x="8104949" y="5328065"/>
-              <a:ext cx="420789" cy="613148"/>
+              <a:off x="8218183" y="5379184"/>
+              <a:ext cx="0" cy="586581"/>
             </a:xfrm>
             <a:prstGeom prst="straightConnector1">
               <a:avLst/>
@@ -36535,7 +36703,7 @@
           <p:spPr>
             <a:xfrm>
               <a:off x="6388346" y="5968725"/>
-              <a:ext cx="1120820" cy="600164"/>
+              <a:ext cx="1095172" cy="600164"/>
             </a:xfrm>
             <a:prstGeom prst="rect">
               <a:avLst/>
@@ -36557,6 +36725,16 @@
             <a:lstStyle/>
             <a:p>
               <a:r>
+                <a:rPr lang="de-DE" sz="1100" dirty="0" err="1">
+                  <a:solidFill>
+                    <a:schemeClr val="bg2">
+                      <a:lumMod val="50000"/>
+                    </a:schemeClr>
+                  </a:solidFill>
+                </a:rPr>
+                <a:t>hidden</a:t>
+              </a:r>
+              <a:r>
                 <a:rPr lang="de-DE" sz="1100" dirty="0">
                   <a:solidFill>
                     <a:schemeClr val="bg2">
@@ -36564,7 +36742,27 @@
                     </a:schemeClr>
                   </a:solidFill>
                 </a:rPr>
-                <a:t>Hidden State </a:t>
+                <a:t> </a:t>
+              </a:r>
+              <a:r>
+                <a:rPr lang="de-DE" sz="1100" dirty="0" err="1">
+                  <a:solidFill>
+                    <a:schemeClr val="bg2">
+                      <a:lumMod val="50000"/>
+                    </a:schemeClr>
+                  </a:solidFill>
+                </a:rPr>
+                <a:t>state</a:t>
+              </a:r>
+              <a:r>
+                <a:rPr lang="de-DE" sz="1100" dirty="0">
+                  <a:solidFill>
+                    <a:schemeClr val="bg2">
+                      <a:lumMod val="50000"/>
+                    </a:schemeClr>
+                  </a:solidFill>
+                </a:rPr>
+                <a:t> </a:t>
               </a:r>
             </a:p>
             <a:p>
@@ -36598,7 +36796,7 @@
                     </a:schemeClr>
                   </a:solidFill>
                 </a:rPr>
-                <a:t>Cell</a:t>
+                <a:t>cell</a:t>
               </a:r>
               <a:r>
                 <a:rPr lang="de-DE" sz="1100" dirty="0">
@@ -36618,7 +36816,7 @@
                     </a:schemeClr>
                   </a:solidFill>
                 </a:rPr>
-                <a:t>Sequence</a:t>
+                <a:t>sequence</a:t>
               </a:r>
               <a:endParaRPr lang="de-DE" sz="1100" dirty="0">
                 <a:solidFill>
@@ -36647,8 +36845,8 @@
           </p:nvCxnSpPr>
           <p:spPr>
             <a:xfrm flipV="1">
-              <a:off x="6948756" y="5270170"/>
-              <a:ext cx="400619" cy="698555"/>
+              <a:off x="6935932" y="5270170"/>
+              <a:ext cx="413443" cy="698555"/>
             </a:xfrm>
             <a:prstGeom prst="straightConnector1">
               <a:avLst/>
@@ -36692,7 +36890,7 @@
           </p:nvSpPr>
           <p:spPr>
             <a:xfrm>
-              <a:off x="8860523" y="5929108"/>
+              <a:off x="8608960" y="5965765"/>
               <a:ext cx="956061" cy="261610"/>
             </a:xfrm>
             <a:prstGeom prst="rect">
@@ -36761,7 +36959,7 @@
           </p:nvCxnSpPr>
           <p:spPr>
             <a:xfrm flipH="1" flipV="1">
-              <a:off x="9338553" y="5327850"/>
+              <a:off x="9086990" y="5364507"/>
               <a:ext cx="1" cy="601258"/>
             </a:xfrm>
             <a:prstGeom prst="straightConnector1">
@@ -36932,8 +37130,8 @@
             </a:p>
           </p:txBody>
         </p:sp>
-        <mc:AlternateContent xmlns:mc="http://schemas.openxmlformats.org/markup-compatibility/2006" xmlns:a14="http://schemas.microsoft.com/office/drawing/2010/main">
-          <mc:Choice Requires="a14">
+        <mc:AlternateContent xmlns:mc="http://schemas.openxmlformats.org/markup-compatibility/2006">
+          <mc:Choice xmlns:a14="http://schemas.microsoft.com/office/drawing/2010/main" Requires="a14">
             <p:sp>
               <p:nvSpPr>
                 <p:cNvPr id="223" name="Flussdiagramm: Verbinder 222">
@@ -37003,7 +37201,7 @@
                               <a:rPr lang="de-DE" sz="1000" b="0" i="1" smtClean="0">
                                 <a:latin typeface="Cambria Math" panose="02040503050406030204" pitchFamily="18" charset="0"/>
                               </a:rPr>
-                              <m:t>𝐴</m:t>
+                              <m:t>𝑥</m:t>
                             </m:r>
                           </m:e>
                           <m:sup>
@@ -37023,7 +37221,7 @@
               </p:txBody>
             </p:sp>
           </mc:Choice>
-          <mc:Fallback xmlns="">
+          <mc:Fallback>
             <p:sp>
               <p:nvSpPr>
                 <p:cNvPr id="223" name="Flussdiagramm: Verbinder 222">
@@ -37709,8 +37907,8 @@
         </p:nvSpPr>
         <p:spPr>
           <a:xfrm>
-            <a:off x="7679184" y="1811045"/>
-            <a:ext cx="3991619" cy="1754326"/>
+            <a:off x="7495540" y="1799424"/>
+            <a:ext cx="4097811" cy="1754326"/>
           </a:xfrm>
           <a:prstGeom prst="rect">
             <a:avLst/>
@@ -37724,54 +37922,108 @@
           <a:lstStyle/>
           <a:p>
             <a:r>
-              <a:rPr lang="de-DE" b="1" dirty="0"/>
+              <a:rPr lang="de-DE" b="1" dirty="0">
+                <a:solidFill>
+                  <a:srgbClr val="44546A"/>
+                </a:solidFill>
+              </a:rPr>
               <a:t>Optimizer:</a:t>
             </a:r>
             <a:r>
-              <a:rPr lang="de-DE" dirty="0"/>
+              <a:rPr lang="de-DE" dirty="0">
+                <a:solidFill>
+                  <a:srgbClr val="44546A"/>
+                </a:solidFill>
+              </a:rPr>
               <a:t> Adam</a:t>
             </a:r>
           </a:p>
           <a:p>
             <a:r>
-              <a:rPr lang="de-DE" b="1" dirty="0"/>
+              <a:rPr lang="de-DE" b="1" dirty="0">
+                <a:solidFill>
+                  <a:srgbClr val="44546A"/>
+                </a:solidFill>
+              </a:rPr>
               <a:t>Learning Rate: </a:t>
             </a:r>
             <a:r>
-              <a:rPr lang="de-DE" dirty="0"/>
+              <a:rPr lang="de-DE" dirty="0">
+                <a:solidFill>
+                  <a:srgbClr val="44546A"/>
+                </a:solidFill>
+              </a:rPr>
               <a:t>0.001</a:t>
             </a:r>
           </a:p>
           <a:p>
             <a:r>
-              <a:rPr lang="en-US" b="1" dirty="0"/>
+              <a:rPr lang="en-US" b="1" dirty="0">
+                <a:solidFill>
+                  <a:srgbClr val="44546A"/>
+                </a:solidFill>
+              </a:rPr>
               <a:t>Batch Size: </a:t>
             </a:r>
             <a:r>
-              <a:rPr lang="en-US" dirty="0"/>
+              <a:rPr lang="en-US" dirty="0">
+                <a:solidFill>
+                  <a:srgbClr val="44546A"/>
+                </a:solidFill>
+              </a:rPr>
               <a:t>1</a:t>
             </a:r>
           </a:p>
           <a:p>
             <a:r>
-              <a:rPr lang="en-US" b="1" dirty="0"/>
+              <a:rPr lang="en-US" b="1" dirty="0">
+                <a:solidFill>
+                  <a:srgbClr val="44546A"/>
+                </a:solidFill>
+              </a:rPr>
               <a:t>Epochs: </a:t>
             </a:r>
             <a:r>
-              <a:rPr lang="en-US" dirty="0"/>
-              <a:t>50</a:t>
+              <a:rPr lang="en-US" dirty="0">
+                <a:solidFill>
+                  <a:srgbClr val="44546A"/>
+                </a:solidFill>
+              </a:rPr>
+              <a:t>150</a:t>
             </a:r>
           </a:p>
           <a:p>
             <a:r>
-              <a:rPr lang="en-US" b="1" dirty="0"/>
-              <a:t>Percentage of Data used for Training / Validation: </a:t>
+              <a:rPr lang="en-US" b="1" dirty="0">
+                <a:solidFill>
+                  <a:srgbClr val="44546A"/>
+                </a:solidFill>
+              </a:rPr>
+              <a:t>Percentage of Data used for </a:t>
+            </a:r>
+          </a:p>
+          <a:p>
+            <a:r>
+              <a:rPr lang="en-US" b="1" dirty="0">
+                <a:solidFill>
+                  <a:srgbClr val="44546A"/>
+                </a:solidFill>
+              </a:rPr>
+              <a:t>Training / Validation / Test: </a:t>
             </a:r>
             <a:r>
-              <a:rPr lang="en-US" dirty="0"/>
-              <a:t>0.7 / 0.1</a:t>
+              <a:rPr lang="en-US" dirty="0">
+                <a:solidFill>
+                  <a:srgbClr val="44546A"/>
+                </a:solidFill>
+              </a:rPr>
+              <a:t>0.7 / 0.1 / 0.2</a:t>
             </a:r>
-            <a:endParaRPr lang="de-DE" dirty="0"/>
+            <a:endParaRPr lang="de-DE" dirty="0">
+              <a:solidFill>
+                <a:srgbClr val="44546A"/>
+              </a:solidFill>
+            </a:endParaRPr>
           </a:p>
         </p:txBody>
       </p:sp>
@@ -39870,7 +40122,7 @@
             <p:ph idx="1"/>
           </p:nvPr>
         </p:nvPicPr>
-        <p:blipFill>
+        <p:blipFill rotWithShape="1">
           <a:blip r:embed="rId2">
             <a:extLst>
               <a:ext uri="{28A0092B-C50C-407E-A947-70E740481C1C}">
@@ -39878,14 +40130,13 @@
               </a:ext>
             </a:extLst>
           </a:blip>
-          <a:stretch>
-            <a:fillRect/>
-          </a:stretch>
+          <a:srcRect l="21678"/>
+          <a:stretch/>
         </p:blipFill>
         <p:spPr>
           <a:xfrm>
-            <a:off x="-247640" y="1366289"/>
-            <a:ext cx="8362720" cy="4316383"/>
+            <a:off x="-306" y="1366289"/>
+            <a:ext cx="8115385" cy="5348053"/>
           </a:xfrm>
         </p:spPr>
       </p:pic>
@@ -39918,19 +40169,35 @@
           <a:lstStyle/>
           <a:p>
             <a:r>
-              <a:rPr lang="de-DE" b="1" dirty="0" err="1"/>
+              <a:rPr lang="de-DE" b="1" dirty="0" err="1">
+                <a:solidFill>
+                  <a:srgbClr val="44546A"/>
+                </a:solidFill>
+              </a:rPr>
               <a:t>Accuracy</a:t>
             </a:r>
             <a:r>
-              <a:rPr lang="de-DE" b="1" dirty="0"/>
+              <a:rPr lang="de-DE" b="1" dirty="0">
+                <a:solidFill>
+                  <a:srgbClr val="44546A"/>
+                </a:solidFill>
+              </a:rPr>
               <a:t>: </a:t>
             </a:r>
             <a:r>
-              <a:rPr lang="de-DE" sz="1200" dirty="0"/>
+              <a:rPr lang="de-DE" sz="1200" dirty="0">
+                <a:solidFill>
+                  <a:srgbClr val="44546A"/>
+                </a:solidFill>
+              </a:rPr>
               <a:t>~</a:t>
             </a:r>
             <a:r>
-              <a:rPr lang="de-DE" dirty="0"/>
+              <a:rPr lang="de-DE" dirty="0">
+                <a:solidFill>
+                  <a:srgbClr val="44546A"/>
+                </a:solidFill>
+              </a:rPr>
               <a:t> 91.62%</a:t>
             </a:r>
           </a:p>
@@ -42790,192 +43057,555 @@
           <a:lstStyle/>
           <a:p>
             <a:r>
-              <a:rPr lang="de-DE" dirty="0" err="1"/>
+              <a:rPr lang="de-DE" dirty="0" err="1">
+                <a:solidFill>
+                  <a:srgbClr val="44546A"/>
+                </a:solidFill>
+              </a:rPr>
               <a:t>Efficient</a:t>
             </a:r>
             <a:r>
-              <a:rPr lang="de-DE" dirty="0"/>
+              <a:rPr lang="de-DE" dirty="0">
+                <a:solidFill>
+                  <a:srgbClr val="44546A"/>
+                </a:solidFill>
+              </a:rPr>
               <a:t> and </a:t>
             </a:r>
             <a:r>
-              <a:rPr lang="de-DE" dirty="0" err="1"/>
+              <a:rPr lang="de-DE" dirty="0" err="1">
+                <a:solidFill>
+                  <a:srgbClr val="44546A"/>
+                </a:solidFill>
+              </a:rPr>
               <a:t>accurate</a:t>
             </a:r>
             <a:r>
-              <a:rPr lang="de-DE" dirty="0"/>
+              <a:rPr lang="de-DE" dirty="0">
+                <a:solidFill>
+                  <a:srgbClr val="44546A"/>
+                </a:solidFill>
+              </a:rPr>
               <a:t> </a:t>
             </a:r>
             <a:r>
-              <a:rPr lang="de-DE" dirty="0" err="1"/>
+              <a:rPr lang="de-DE" dirty="0" err="1">
+                <a:solidFill>
+                  <a:srgbClr val="44546A"/>
+                </a:solidFill>
+              </a:rPr>
               <a:t>tracking</a:t>
             </a:r>
             <a:r>
-              <a:rPr lang="de-DE" dirty="0"/>
+              <a:rPr lang="de-DE" dirty="0">
+                <a:solidFill>
+                  <a:srgbClr val="44546A"/>
+                </a:solidFill>
+              </a:rPr>
               <a:t> </a:t>
             </a:r>
             <a:r>
-              <a:rPr lang="de-DE" dirty="0" err="1"/>
+              <a:rPr lang="de-DE" dirty="0" err="1">
+                <a:solidFill>
+                  <a:srgbClr val="44546A"/>
+                </a:solidFill>
+              </a:rPr>
               <a:t>of</a:t>
             </a:r>
             <a:r>
-              <a:rPr lang="de-DE" dirty="0"/>
+              <a:rPr lang="de-DE" dirty="0">
+                <a:solidFill>
+                  <a:srgbClr val="44546A"/>
+                </a:solidFill>
+              </a:rPr>
               <a:t> human </a:t>
             </a:r>
             <a:r>
-              <a:rPr lang="de-DE" dirty="0" err="1"/>
+              <a:rPr lang="de-DE" dirty="0" err="1">
+                <a:solidFill>
+                  <a:srgbClr val="44546A"/>
+                </a:solidFill>
+              </a:rPr>
               <a:t>motion</a:t>
             </a:r>
             <a:r>
-              <a:rPr lang="de-DE" dirty="0"/>
+              <a:rPr lang="de-DE" dirty="0">
+                <a:solidFill>
+                  <a:srgbClr val="44546A"/>
+                </a:solidFill>
+              </a:rPr>
               <a:t> primitives</a:t>
             </a:r>
           </a:p>
           <a:p>
             <a:pPr lvl="1"/>
             <a:r>
-              <a:rPr lang="de-DE" dirty="0"/>
+              <a:rPr lang="de-DE" dirty="0">
+                <a:solidFill>
+                  <a:srgbClr val="44546A"/>
+                </a:solidFill>
+              </a:rPr>
               <a:t>Low </a:t>
             </a:r>
             <a:r>
-              <a:rPr lang="de-DE" dirty="0" err="1"/>
+              <a:rPr lang="de-DE" dirty="0" err="1">
+                <a:solidFill>
+                  <a:srgbClr val="44546A"/>
+                </a:solidFill>
+              </a:rPr>
               <a:t>training</a:t>
             </a:r>
             <a:r>
-              <a:rPr lang="de-DE" dirty="0"/>
+              <a:rPr lang="de-DE" dirty="0">
+                <a:solidFill>
+                  <a:srgbClr val="44546A"/>
+                </a:solidFill>
+              </a:rPr>
+              <a:t> , </a:t>
+            </a:r>
+            <a:r>
+              <a:rPr lang="de-DE" dirty="0" err="1">
+                <a:solidFill>
+                  <a:srgbClr val="44546A"/>
+                </a:solidFill>
+              </a:rPr>
+              <a:t>validation</a:t>
+            </a:r>
+            <a:r>
+              <a:rPr lang="de-DE" dirty="0">
+                <a:solidFill>
+                  <a:srgbClr val="44546A"/>
+                </a:solidFill>
+              </a:rPr>
               <a:t> and </a:t>
             </a:r>
             <a:r>
-              <a:rPr lang="de-DE" dirty="0" err="1"/>
-              <a:t>validation</a:t>
+              <a:rPr lang="de-DE" dirty="0" err="1">
+                <a:solidFill>
+                  <a:srgbClr val="44546A"/>
+                </a:solidFill>
+              </a:rPr>
+              <a:t>test</a:t>
             </a:r>
             <a:r>
-              <a:rPr lang="de-DE" dirty="0"/>
+              <a:rPr lang="de-DE" dirty="0">
+                <a:solidFill>
+                  <a:srgbClr val="44546A"/>
+                </a:solidFill>
+              </a:rPr>
               <a:t> </a:t>
             </a:r>
             <a:r>
-              <a:rPr lang="de-DE" dirty="0" err="1"/>
+              <a:rPr lang="de-DE" dirty="0" err="1">
+                <a:solidFill>
+                  <a:srgbClr val="44546A"/>
+                </a:solidFill>
+              </a:rPr>
               <a:t>loss</a:t>
             </a:r>
             <a:r>
-              <a:rPr lang="de-DE" dirty="0"/>
+              <a:rPr lang="de-DE" dirty="0">
+                <a:solidFill>
+                  <a:srgbClr val="44546A"/>
+                </a:solidFill>
+              </a:rPr>
               <a:t> after </a:t>
             </a:r>
             <a:r>
-              <a:rPr lang="de-DE" dirty="0" err="1"/>
+              <a:rPr lang="de-DE" dirty="0" err="1">
+                <a:solidFill>
+                  <a:srgbClr val="44546A"/>
+                </a:solidFill>
+              </a:rPr>
               <a:t>training</a:t>
             </a:r>
-            <a:endParaRPr lang="de-DE" dirty="0"/>
+            <a:r>
+              <a:rPr lang="de-DE" dirty="0">
+                <a:solidFill>
+                  <a:srgbClr val="44546A"/>
+                </a:solidFill>
+              </a:rPr>
+              <a:t> (</a:t>
+            </a:r>
+            <a:r>
+              <a:rPr lang="de-DE" dirty="0" err="1">
+                <a:solidFill>
+                  <a:srgbClr val="44546A"/>
+                </a:solidFill>
+              </a:rPr>
+              <a:t>compared</a:t>
+            </a:r>
+            <a:r>
+              <a:rPr lang="de-DE" dirty="0">
+                <a:solidFill>
+                  <a:srgbClr val="44546A"/>
+                </a:solidFill>
+              </a:rPr>
+              <a:t> </a:t>
+            </a:r>
+            <a:r>
+              <a:rPr lang="de-DE" dirty="0" err="1">
+                <a:solidFill>
+                  <a:srgbClr val="44546A"/>
+                </a:solidFill>
+              </a:rPr>
+              <a:t>to</a:t>
+            </a:r>
+            <a:r>
+              <a:rPr lang="de-DE" dirty="0">
+                <a:solidFill>
+                  <a:srgbClr val="44546A"/>
+                </a:solidFill>
+              </a:rPr>
+              <a:t> a </a:t>
+            </a:r>
+            <a:r>
+              <a:rPr lang="de-DE" dirty="0" err="1">
+                <a:solidFill>
+                  <a:srgbClr val="44546A"/>
+                </a:solidFill>
+              </a:rPr>
+              <a:t>baseline</a:t>
+            </a:r>
+            <a:r>
+              <a:rPr lang="de-DE" dirty="0">
+                <a:solidFill>
+                  <a:srgbClr val="44546A"/>
+                </a:solidFill>
+              </a:rPr>
+              <a:t> </a:t>
+            </a:r>
+            <a:r>
+              <a:rPr lang="de-DE" dirty="0" err="1">
+                <a:solidFill>
+                  <a:srgbClr val="44546A"/>
+                </a:solidFill>
+              </a:rPr>
+              <a:t>model</a:t>
+            </a:r>
+            <a:r>
+              <a:rPr lang="de-DE" dirty="0">
+                <a:solidFill>
+                  <a:srgbClr val="44546A"/>
+                </a:solidFill>
+              </a:rPr>
+              <a:t>)</a:t>
+            </a:r>
           </a:p>
           <a:p>
             <a:pPr lvl="1"/>
             <a:r>
-              <a:rPr lang="de-DE" dirty="0"/>
+              <a:rPr lang="de-DE" dirty="0">
+                <a:solidFill>
+                  <a:srgbClr val="44546A"/>
+                </a:solidFill>
+              </a:rPr>
               <a:t>High </a:t>
             </a:r>
             <a:r>
-              <a:rPr lang="de-DE" dirty="0" err="1"/>
-              <a:t>Accuracy</a:t>
+              <a:rPr lang="de-DE" dirty="0" err="1">
+                <a:solidFill>
+                  <a:srgbClr val="44546A"/>
+                </a:solidFill>
+              </a:rPr>
+              <a:t>accuracy</a:t>
             </a:r>
             <a:r>
-              <a:rPr lang="de-DE" dirty="0"/>
+              <a:rPr lang="de-DE" dirty="0">
+                <a:solidFill>
+                  <a:srgbClr val="44546A"/>
+                </a:solidFill>
+              </a:rPr>
               <a:t> </a:t>
             </a:r>
             <a:r>
-              <a:rPr lang="de-DE" dirty="0" err="1"/>
+              <a:rPr lang="de-DE" dirty="0" err="1">
+                <a:solidFill>
+                  <a:srgbClr val="44546A"/>
+                </a:solidFill>
+              </a:rPr>
               <a:t>of</a:t>
             </a:r>
             <a:r>
-              <a:rPr lang="de-DE" dirty="0"/>
+              <a:rPr lang="de-DE" dirty="0">
+                <a:solidFill>
+                  <a:srgbClr val="44546A"/>
+                </a:solidFill>
+              </a:rPr>
               <a:t> </a:t>
             </a:r>
             <a:r>
-              <a:rPr lang="de-DE" dirty="0" err="1"/>
+              <a:rPr lang="de-DE" dirty="0" err="1">
+                <a:solidFill>
+                  <a:srgbClr val="44546A"/>
+                </a:solidFill>
+              </a:rPr>
               <a:t>the</a:t>
             </a:r>
             <a:r>
-              <a:rPr lang="de-DE" dirty="0"/>
+              <a:rPr lang="de-DE" dirty="0">
+                <a:solidFill>
+                  <a:srgbClr val="44546A"/>
+                </a:solidFill>
+              </a:rPr>
               <a:t> </a:t>
             </a:r>
             <a:r>
-              <a:rPr lang="de-DE" dirty="0" err="1"/>
-              <a:t>Prediction</a:t>
+              <a:rPr lang="de-DE" dirty="0" err="1">
+                <a:solidFill>
+                  <a:srgbClr val="44546A"/>
+                </a:solidFill>
+              </a:rPr>
+              <a:t>prediction</a:t>
             </a:r>
-            <a:endParaRPr lang="de-DE" dirty="0"/>
+            <a:endParaRPr lang="de-DE" dirty="0">
+              <a:solidFill>
+                <a:srgbClr val="44546A"/>
+              </a:solidFill>
+            </a:endParaRPr>
           </a:p>
           <a:p>
             <a:pPr lvl="1"/>
-            <a:endParaRPr lang="de-DE" dirty="0"/>
+            <a:endParaRPr lang="de-DE" dirty="0">
+              <a:solidFill>
+                <a:srgbClr val="44546A"/>
+              </a:solidFill>
+            </a:endParaRPr>
           </a:p>
           <a:p>
             <a:pPr lvl="1"/>
-            <a:endParaRPr lang="de-DE" dirty="0"/>
+            <a:endParaRPr lang="de-DE" dirty="0">
+              <a:solidFill>
+                <a:srgbClr val="44546A"/>
+              </a:solidFill>
+            </a:endParaRPr>
           </a:p>
           <a:p>
             <a:r>
-              <a:rPr lang="de-DE" dirty="0"/>
+              <a:rPr lang="de-DE" dirty="0">
+                <a:solidFill>
+                  <a:srgbClr val="44546A"/>
+                </a:solidFill>
+              </a:rPr>
               <a:t>Possible Further </a:t>
             </a:r>
             <a:r>
-              <a:rPr lang="de-DE" dirty="0" err="1"/>
+              <a:rPr lang="de-DE" dirty="0" err="1">
+                <a:solidFill>
+                  <a:srgbClr val="44546A"/>
+                </a:solidFill>
+              </a:rPr>
               <a:t>Improvements</a:t>
             </a:r>
-            <a:endParaRPr lang="de-DE" dirty="0"/>
+            <a:endParaRPr lang="de-DE" dirty="0">
+              <a:solidFill>
+                <a:srgbClr val="44546A"/>
+              </a:solidFill>
+            </a:endParaRPr>
           </a:p>
           <a:p>
             <a:pPr lvl="1"/>
             <a:r>
-              <a:rPr lang="de-DE" dirty="0"/>
+              <a:rPr lang="de-DE" dirty="0" err="1">
+                <a:solidFill>
+                  <a:srgbClr val="44546A"/>
+                </a:solidFill>
+              </a:rPr>
+              <a:t>Extend</a:t>
+            </a:r>
+            <a:r>
+              <a:rPr lang="de-DE" dirty="0">
+                <a:solidFill>
+                  <a:srgbClr val="44546A"/>
+                </a:solidFill>
+              </a:rPr>
+              <a:t> </a:t>
+            </a:r>
+            <a:r>
+              <a:rPr lang="de-DE" dirty="0" err="1">
+                <a:solidFill>
+                  <a:srgbClr val="44546A"/>
+                </a:solidFill>
+              </a:rPr>
+              <a:t>model</a:t>
+            </a:r>
+            <a:r>
+              <a:rPr lang="de-DE" dirty="0">
+                <a:solidFill>
+                  <a:srgbClr val="44546A"/>
+                </a:solidFill>
+              </a:rPr>
+              <a:t> </a:t>
+            </a:r>
+            <a:r>
+              <a:rPr lang="de-DE" dirty="0" err="1">
+                <a:solidFill>
+                  <a:srgbClr val="44546A"/>
+                </a:solidFill>
+              </a:rPr>
+              <a:t>to</a:t>
+            </a:r>
+            <a:r>
+              <a:rPr lang="de-DE" dirty="0">
+                <a:solidFill>
+                  <a:srgbClr val="44546A"/>
+                </a:solidFill>
+              </a:rPr>
+              <a:t> </a:t>
+            </a:r>
+            <a:r>
+              <a:rPr lang="de-DE" dirty="0" err="1">
+                <a:solidFill>
+                  <a:srgbClr val="44546A"/>
+                </a:solidFill>
+              </a:rPr>
+              <a:t>include</a:t>
+            </a:r>
+            <a:r>
+              <a:rPr lang="de-DE" dirty="0">
+                <a:solidFill>
+                  <a:srgbClr val="44546A"/>
+                </a:solidFill>
+              </a:rPr>
+              <a:t> </a:t>
+            </a:r>
+            <a:r>
+              <a:rPr lang="de-DE" dirty="0" err="1">
+                <a:solidFill>
+                  <a:srgbClr val="44546A"/>
+                </a:solidFill>
+              </a:rPr>
+              <a:t>other</a:t>
+            </a:r>
+            <a:r>
+              <a:rPr lang="de-DE" dirty="0">
+                <a:solidFill>
+                  <a:srgbClr val="44546A"/>
+                </a:solidFill>
+              </a:rPr>
+              <a:t> </a:t>
+            </a:r>
+            <a:r>
+              <a:rPr lang="de-DE" dirty="0" err="1">
+                <a:solidFill>
+                  <a:srgbClr val="44546A"/>
+                </a:solidFill>
+              </a:rPr>
+              <a:t>activities</a:t>
+            </a:r>
+            <a:endParaRPr lang="de-DE" dirty="0">
+              <a:solidFill>
+                <a:srgbClr val="44546A"/>
+              </a:solidFill>
+            </a:endParaRPr>
+          </a:p>
+          <a:p>
+            <a:pPr lvl="1"/>
+            <a:r>
+              <a:rPr lang="de-DE" dirty="0">
+                <a:solidFill>
+                  <a:srgbClr val="44546A"/>
+                </a:solidFill>
+              </a:rPr>
               <a:t>Test </a:t>
             </a:r>
             <a:r>
-              <a:rPr lang="de-DE" dirty="0" err="1"/>
+              <a:rPr lang="de-DE" dirty="0" err="1">
+                <a:solidFill>
+                  <a:srgbClr val="44546A"/>
+                </a:solidFill>
+              </a:rPr>
               <a:t>with</a:t>
             </a:r>
             <a:r>
-              <a:rPr lang="de-DE" dirty="0"/>
+              <a:rPr lang="de-DE" dirty="0">
+                <a:solidFill>
+                  <a:srgbClr val="44546A"/>
+                </a:solidFill>
+              </a:rPr>
               <a:t> different </a:t>
             </a:r>
             <a:r>
-              <a:rPr lang="de-DE" dirty="0" err="1"/>
+              <a:rPr lang="de-DE" dirty="0" err="1">
+                <a:solidFill>
+                  <a:srgbClr val="44546A"/>
+                </a:solidFill>
+              </a:rPr>
               <a:t>optimizers</a:t>
             </a:r>
             <a:r>
-              <a:rPr lang="de-DE" dirty="0"/>
+              <a:rPr lang="de-DE" dirty="0">
+                <a:solidFill>
+                  <a:srgbClr val="44546A"/>
+                </a:solidFill>
+              </a:rPr>
               <a:t> </a:t>
             </a:r>
           </a:p>
           <a:p>
             <a:pPr lvl="1"/>
             <a:r>
-              <a:rPr lang="de-DE" dirty="0" err="1"/>
+              <a:rPr lang="de-DE" dirty="0" err="1">
+                <a:solidFill>
+                  <a:srgbClr val="44546A"/>
+                </a:solidFill>
+              </a:rPr>
               <a:t>Compare</a:t>
             </a:r>
             <a:r>
-              <a:rPr lang="de-DE" dirty="0"/>
+              <a:rPr lang="de-DE" dirty="0">
+                <a:solidFill>
+                  <a:srgbClr val="44546A"/>
+                </a:solidFill>
+              </a:rPr>
               <a:t> </a:t>
             </a:r>
             <a:r>
-              <a:rPr lang="de-DE" dirty="0" err="1"/>
+              <a:rPr lang="de-DE" dirty="0" err="1">
+                <a:solidFill>
+                  <a:srgbClr val="44546A"/>
+                </a:solidFill>
+              </a:rPr>
               <a:t>to</a:t>
             </a:r>
             <a:r>
-              <a:rPr lang="de-DE" dirty="0"/>
+              <a:rPr lang="de-DE" dirty="0">
+                <a:solidFill>
+                  <a:srgbClr val="44546A"/>
+                </a:solidFill>
+              </a:rPr>
               <a:t> </a:t>
             </a:r>
             <a:r>
-              <a:rPr lang="de-DE" dirty="0" err="1"/>
+              <a:rPr lang="de-DE" dirty="0" err="1">
+                <a:solidFill>
+                  <a:srgbClr val="44546A"/>
+                </a:solidFill>
+              </a:rPr>
               <a:t>other</a:t>
             </a:r>
             <a:r>
-              <a:rPr lang="de-DE" dirty="0"/>
+              <a:rPr lang="de-DE" dirty="0">
+                <a:solidFill>
+                  <a:srgbClr val="44546A"/>
+                </a:solidFill>
+              </a:rPr>
               <a:t> </a:t>
             </a:r>
             <a:r>
-              <a:rPr lang="de-DE" dirty="0" err="1"/>
+              <a:rPr lang="de-DE" dirty="0" err="1">
+                <a:solidFill>
+                  <a:srgbClr val="44546A"/>
+                </a:solidFill>
+              </a:rPr>
               <a:t>algorithms</a:t>
             </a:r>
             <a:r>
-              <a:rPr lang="de-DE" dirty="0"/>
+              <a:rPr lang="de-DE" dirty="0">
+                <a:solidFill>
+                  <a:srgbClr val="44546A"/>
+                </a:solidFill>
+              </a:rPr>
               <a:t> </a:t>
             </a:r>
           </a:p>

</xml_diff>